<commit_message>
made a simple posture detector
</commit_message>
<xml_diff>
--- a/v2/assets/images/poses/pose powerpoint.pptx
+++ b/v2/assets/images/poses/pose powerpoint.pptx
@@ -6,7 +6,12 @@
   </p:sldMasterIdLst>
   <p:sldIdLst>
     <p:sldId id="256" r:id="rId2"/>
-    <p:sldId id="257" r:id="rId3"/>
+    <p:sldId id="263" r:id="rId3"/>
+    <p:sldId id="264" r:id="rId4"/>
+    <p:sldId id="265" r:id="rId5"/>
+    <p:sldId id="266" r:id="rId6"/>
+    <p:sldId id="267" r:id="rId7"/>
+    <p:sldId id="257" r:id="rId8"/>
   </p:sldIdLst>
   <p:sldSz cx="9144000" cy="6858000" type="screen4x3"/>
   <p:notesSz cx="6858000" cy="9144000"/>
@@ -105,6 +110,22 @@
       </a:defRPr>
     </a:lvl9pPr>
   </p:defaultTextStyle>
+  <p:extLst>
+    <p:ext uri="{EFAFB233-063F-42B5-8137-9DF3F51BA10A}">
+      <p15:sldGuideLst xmlns:p15="http://schemas.microsoft.com/office/powerpoint/2012/main">
+        <p15:guide id="1" orient="horz" pos="2160">
+          <p15:clr>
+            <a:srgbClr val="A4A3A4"/>
+          </p15:clr>
+        </p15:guide>
+        <p15:guide id="2" pos="2880">
+          <p15:clr>
+            <a:srgbClr val="A4A3A4"/>
+          </p15:clr>
+        </p15:guide>
+      </p15:sldGuideLst>
+    </p:ext>
+  </p:extLst>
 </p:presentation>
 </file>
 
@@ -146,7 +167,7 @@
           <a:lstStyle/>
           <a:p>
             <a:r>
-              <a:rPr lang="en-US" smtClean="0"/>
+              <a:rPr lang="en-US"/>
               <a:t>Click to edit Master title style</a:t>
             </a:r>
             <a:endParaRPr lang="en-CA"/>
@@ -265,7 +286,7 @@
           </a:lstStyle>
           <a:p>
             <a:r>
-              <a:rPr lang="en-US" smtClean="0"/>
+              <a:rPr lang="en-US"/>
               <a:t>Click to edit Master subtitle style</a:t>
             </a:r>
             <a:endParaRPr lang="en-CA"/>
@@ -290,7 +311,7 @@
             <a:fld id="{AA0746AA-6444-41D4-ADB4-FD3977883641}" type="datetimeFigureOut">
               <a:rPr lang="en-US" smtClean="0"/>
               <a:pPr/>
-              <a:t>4/20/2019</a:t>
+              <a:t>4/29/19</a:t>
             </a:fld>
             <a:endParaRPr lang="en-CA"/>
           </a:p>
@@ -380,7 +401,7 @@
           <a:lstStyle/>
           <a:p>
             <a:r>
-              <a:rPr lang="en-US" smtClean="0"/>
+              <a:rPr lang="en-US"/>
               <a:t>Click to edit Master title style</a:t>
             </a:r>
             <a:endParaRPr lang="en-CA"/>
@@ -404,35 +425,35 @@
           <a:p>
             <a:pPr lvl="0"/>
             <a:r>
-              <a:rPr lang="en-US" smtClean="0"/>
+              <a:rPr lang="en-US"/>
               <a:t>Click to edit Master text styles</a:t>
             </a:r>
           </a:p>
           <a:p>
             <a:pPr lvl="1"/>
             <a:r>
-              <a:rPr lang="en-US" smtClean="0"/>
+              <a:rPr lang="en-US"/>
               <a:t>Second level</a:t>
             </a:r>
           </a:p>
           <a:p>
             <a:pPr lvl="2"/>
             <a:r>
-              <a:rPr lang="en-US" smtClean="0"/>
+              <a:rPr lang="en-US"/>
               <a:t>Third level</a:t>
             </a:r>
           </a:p>
           <a:p>
             <a:pPr lvl="3"/>
             <a:r>
-              <a:rPr lang="en-US" smtClean="0"/>
+              <a:rPr lang="en-US"/>
               <a:t>Fourth level</a:t>
             </a:r>
           </a:p>
           <a:p>
             <a:pPr lvl="4"/>
             <a:r>
-              <a:rPr lang="en-US" smtClean="0"/>
+              <a:rPr lang="en-US"/>
               <a:t>Fifth level</a:t>
             </a:r>
             <a:endParaRPr lang="en-CA"/>
@@ -457,7 +478,7 @@
             <a:fld id="{AA0746AA-6444-41D4-ADB4-FD3977883641}" type="datetimeFigureOut">
               <a:rPr lang="en-US" smtClean="0"/>
               <a:pPr/>
-              <a:t>4/20/2019</a:t>
+              <a:t>4/29/19</a:t>
             </a:fld>
             <a:endParaRPr lang="en-CA"/>
           </a:p>
@@ -552,7 +573,7 @@
           <a:lstStyle/>
           <a:p>
             <a:r>
-              <a:rPr lang="en-US" smtClean="0"/>
+              <a:rPr lang="en-US"/>
               <a:t>Click to edit Master title style</a:t>
             </a:r>
             <a:endParaRPr lang="en-CA"/>
@@ -581,35 +602,35 @@
           <a:p>
             <a:pPr lvl="0"/>
             <a:r>
-              <a:rPr lang="en-US" smtClean="0"/>
+              <a:rPr lang="en-US"/>
               <a:t>Click to edit Master text styles</a:t>
             </a:r>
           </a:p>
           <a:p>
             <a:pPr lvl="1"/>
             <a:r>
-              <a:rPr lang="en-US" smtClean="0"/>
+              <a:rPr lang="en-US"/>
               <a:t>Second level</a:t>
             </a:r>
           </a:p>
           <a:p>
             <a:pPr lvl="2"/>
             <a:r>
-              <a:rPr lang="en-US" smtClean="0"/>
+              <a:rPr lang="en-US"/>
               <a:t>Third level</a:t>
             </a:r>
           </a:p>
           <a:p>
             <a:pPr lvl="3"/>
             <a:r>
-              <a:rPr lang="en-US" smtClean="0"/>
+              <a:rPr lang="en-US"/>
               <a:t>Fourth level</a:t>
             </a:r>
           </a:p>
           <a:p>
             <a:pPr lvl="4"/>
             <a:r>
-              <a:rPr lang="en-US" smtClean="0"/>
+              <a:rPr lang="en-US"/>
               <a:t>Fifth level</a:t>
             </a:r>
             <a:endParaRPr lang="en-CA"/>
@@ -634,7 +655,7 @@
             <a:fld id="{AA0746AA-6444-41D4-ADB4-FD3977883641}" type="datetimeFigureOut">
               <a:rPr lang="en-US" smtClean="0"/>
               <a:pPr/>
-              <a:t>4/20/2019</a:t>
+              <a:t>4/29/19</a:t>
             </a:fld>
             <a:endParaRPr lang="en-CA"/>
           </a:p>
@@ -724,7 +745,7 @@
           <a:lstStyle/>
           <a:p>
             <a:r>
-              <a:rPr lang="en-US" smtClean="0"/>
+              <a:rPr lang="en-US"/>
               <a:t>Click to edit Master title style</a:t>
             </a:r>
             <a:endParaRPr lang="en-CA"/>
@@ -748,35 +769,35 @@
           <a:p>
             <a:pPr lvl="0"/>
             <a:r>
-              <a:rPr lang="en-US" smtClean="0"/>
+              <a:rPr lang="en-US"/>
               <a:t>Click to edit Master text styles</a:t>
             </a:r>
           </a:p>
           <a:p>
             <a:pPr lvl="1"/>
             <a:r>
-              <a:rPr lang="en-US" smtClean="0"/>
+              <a:rPr lang="en-US"/>
               <a:t>Second level</a:t>
             </a:r>
           </a:p>
           <a:p>
             <a:pPr lvl="2"/>
             <a:r>
-              <a:rPr lang="en-US" smtClean="0"/>
+              <a:rPr lang="en-US"/>
               <a:t>Third level</a:t>
             </a:r>
           </a:p>
           <a:p>
             <a:pPr lvl="3"/>
             <a:r>
-              <a:rPr lang="en-US" smtClean="0"/>
+              <a:rPr lang="en-US"/>
               <a:t>Fourth level</a:t>
             </a:r>
           </a:p>
           <a:p>
             <a:pPr lvl="4"/>
             <a:r>
-              <a:rPr lang="en-US" smtClean="0"/>
+              <a:rPr lang="en-US"/>
               <a:t>Fifth level</a:t>
             </a:r>
             <a:endParaRPr lang="en-CA"/>
@@ -801,7 +822,7 @@
             <a:fld id="{AA0746AA-6444-41D4-ADB4-FD3977883641}" type="datetimeFigureOut">
               <a:rPr lang="en-US" smtClean="0"/>
               <a:pPr/>
-              <a:t>4/20/2019</a:t>
+              <a:t>4/29/19</a:t>
             </a:fld>
             <a:endParaRPr lang="en-CA"/>
           </a:p>
@@ -900,7 +921,7 @@
           </a:lstStyle>
           <a:p>
             <a:r>
-              <a:rPr lang="en-US" smtClean="0"/>
+              <a:rPr lang="en-US"/>
               <a:t>Click to edit Master title style</a:t>
             </a:r>
             <a:endParaRPr lang="en-CA"/>
@@ -1020,7 +1041,7 @@
           <a:p>
             <a:pPr lvl="0"/>
             <a:r>
-              <a:rPr lang="en-US" smtClean="0"/>
+              <a:rPr lang="en-US"/>
               <a:t>Click to edit Master text styles</a:t>
             </a:r>
           </a:p>
@@ -1044,7 +1065,7 @@
             <a:fld id="{AA0746AA-6444-41D4-ADB4-FD3977883641}" type="datetimeFigureOut">
               <a:rPr lang="en-US" smtClean="0"/>
               <a:pPr/>
-              <a:t>4/20/2019</a:t>
+              <a:t>4/29/19</a:t>
             </a:fld>
             <a:endParaRPr lang="en-CA"/>
           </a:p>
@@ -1134,7 +1155,7 @@
           <a:lstStyle/>
           <a:p>
             <a:r>
-              <a:rPr lang="en-US" smtClean="0"/>
+              <a:rPr lang="en-US"/>
               <a:t>Click to edit Master title style</a:t>
             </a:r>
             <a:endParaRPr lang="en-CA"/>
@@ -1191,35 +1212,35 @@
           <a:p>
             <a:pPr lvl="0"/>
             <a:r>
-              <a:rPr lang="en-US" smtClean="0"/>
+              <a:rPr lang="en-US"/>
               <a:t>Click to edit Master text styles</a:t>
             </a:r>
           </a:p>
           <a:p>
             <a:pPr lvl="1"/>
             <a:r>
-              <a:rPr lang="en-US" smtClean="0"/>
+              <a:rPr lang="en-US"/>
               <a:t>Second level</a:t>
             </a:r>
           </a:p>
           <a:p>
             <a:pPr lvl="2"/>
             <a:r>
-              <a:rPr lang="en-US" smtClean="0"/>
+              <a:rPr lang="en-US"/>
               <a:t>Third level</a:t>
             </a:r>
           </a:p>
           <a:p>
             <a:pPr lvl="3"/>
             <a:r>
-              <a:rPr lang="en-US" smtClean="0"/>
+              <a:rPr lang="en-US"/>
               <a:t>Fourth level</a:t>
             </a:r>
           </a:p>
           <a:p>
             <a:pPr lvl="4"/>
             <a:r>
-              <a:rPr lang="en-US" smtClean="0"/>
+              <a:rPr lang="en-US"/>
               <a:t>Fifth level</a:t>
             </a:r>
             <a:endParaRPr lang="en-CA"/>
@@ -1276,35 +1297,35 @@
           <a:p>
             <a:pPr lvl="0"/>
             <a:r>
-              <a:rPr lang="en-US" smtClean="0"/>
+              <a:rPr lang="en-US"/>
               <a:t>Click to edit Master text styles</a:t>
             </a:r>
           </a:p>
           <a:p>
             <a:pPr lvl="1"/>
             <a:r>
-              <a:rPr lang="en-US" smtClean="0"/>
+              <a:rPr lang="en-US"/>
               <a:t>Second level</a:t>
             </a:r>
           </a:p>
           <a:p>
             <a:pPr lvl="2"/>
             <a:r>
-              <a:rPr lang="en-US" smtClean="0"/>
+              <a:rPr lang="en-US"/>
               <a:t>Third level</a:t>
             </a:r>
           </a:p>
           <a:p>
             <a:pPr lvl="3"/>
             <a:r>
-              <a:rPr lang="en-US" smtClean="0"/>
+              <a:rPr lang="en-US"/>
               <a:t>Fourth level</a:t>
             </a:r>
           </a:p>
           <a:p>
             <a:pPr lvl="4"/>
             <a:r>
-              <a:rPr lang="en-US" smtClean="0"/>
+              <a:rPr lang="en-US"/>
               <a:t>Fifth level</a:t>
             </a:r>
             <a:endParaRPr lang="en-CA"/>
@@ -1329,7 +1350,7 @@
             <a:fld id="{AA0746AA-6444-41D4-ADB4-FD3977883641}" type="datetimeFigureOut">
               <a:rPr lang="en-US" smtClean="0"/>
               <a:pPr/>
-              <a:t>4/20/2019</a:t>
+              <a:t>4/29/19</a:t>
             </a:fld>
             <a:endParaRPr lang="en-CA"/>
           </a:p>
@@ -1423,7 +1444,7 @@
           </a:lstStyle>
           <a:p>
             <a:r>
-              <a:rPr lang="en-US" smtClean="0"/>
+              <a:rPr lang="en-US"/>
               <a:t>Click to edit Master title style</a:t>
             </a:r>
             <a:endParaRPr lang="en-CA"/>
@@ -1489,7 +1510,7 @@
           <a:p>
             <a:pPr lvl="0"/>
             <a:r>
-              <a:rPr lang="en-US" smtClean="0"/>
+              <a:rPr lang="en-US"/>
               <a:t>Click to edit Master text styles</a:t>
             </a:r>
           </a:p>
@@ -1545,35 +1566,35 @@
           <a:p>
             <a:pPr lvl="0"/>
             <a:r>
-              <a:rPr lang="en-US" smtClean="0"/>
+              <a:rPr lang="en-US"/>
               <a:t>Click to edit Master text styles</a:t>
             </a:r>
           </a:p>
           <a:p>
             <a:pPr lvl="1"/>
             <a:r>
-              <a:rPr lang="en-US" smtClean="0"/>
+              <a:rPr lang="en-US"/>
               <a:t>Second level</a:t>
             </a:r>
           </a:p>
           <a:p>
             <a:pPr lvl="2"/>
             <a:r>
-              <a:rPr lang="en-US" smtClean="0"/>
+              <a:rPr lang="en-US"/>
               <a:t>Third level</a:t>
             </a:r>
           </a:p>
           <a:p>
             <a:pPr lvl="3"/>
             <a:r>
-              <a:rPr lang="en-US" smtClean="0"/>
+              <a:rPr lang="en-US"/>
               <a:t>Fourth level</a:t>
             </a:r>
           </a:p>
           <a:p>
             <a:pPr lvl="4"/>
             <a:r>
-              <a:rPr lang="en-US" smtClean="0"/>
+              <a:rPr lang="en-US"/>
               <a:t>Fifth level</a:t>
             </a:r>
             <a:endParaRPr lang="en-CA"/>
@@ -1639,7 +1660,7 @@
           <a:p>
             <a:pPr lvl="0"/>
             <a:r>
-              <a:rPr lang="en-US" smtClean="0"/>
+              <a:rPr lang="en-US"/>
               <a:t>Click to edit Master text styles</a:t>
             </a:r>
           </a:p>
@@ -1695,35 +1716,35 @@
           <a:p>
             <a:pPr lvl="0"/>
             <a:r>
-              <a:rPr lang="en-US" smtClean="0"/>
+              <a:rPr lang="en-US"/>
               <a:t>Click to edit Master text styles</a:t>
             </a:r>
           </a:p>
           <a:p>
             <a:pPr lvl="1"/>
             <a:r>
-              <a:rPr lang="en-US" smtClean="0"/>
+              <a:rPr lang="en-US"/>
               <a:t>Second level</a:t>
             </a:r>
           </a:p>
           <a:p>
             <a:pPr lvl="2"/>
             <a:r>
-              <a:rPr lang="en-US" smtClean="0"/>
+              <a:rPr lang="en-US"/>
               <a:t>Third level</a:t>
             </a:r>
           </a:p>
           <a:p>
             <a:pPr lvl="3"/>
             <a:r>
-              <a:rPr lang="en-US" smtClean="0"/>
+              <a:rPr lang="en-US"/>
               <a:t>Fourth level</a:t>
             </a:r>
           </a:p>
           <a:p>
             <a:pPr lvl="4"/>
             <a:r>
-              <a:rPr lang="en-US" smtClean="0"/>
+              <a:rPr lang="en-US"/>
               <a:t>Fifth level</a:t>
             </a:r>
             <a:endParaRPr lang="en-CA"/>
@@ -1748,7 +1769,7 @@
             <a:fld id="{AA0746AA-6444-41D4-ADB4-FD3977883641}" type="datetimeFigureOut">
               <a:rPr lang="en-US" smtClean="0"/>
               <a:pPr/>
-              <a:t>4/20/2019</a:t>
+              <a:t>4/29/19</a:t>
             </a:fld>
             <a:endParaRPr lang="en-CA"/>
           </a:p>
@@ -1838,7 +1859,7 @@
           <a:lstStyle/>
           <a:p>
             <a:r>
-              <a:rPr lang="en-US" smtClean="0"/>
+              <a:rPr lang="en-US"/>
               <a:t>Click to edit Master title style</a:t>
             </a:r>
             <a:endParaRPr lang="en-CA"/>
@@ -1863,7 +1884,7 @@
             <a:fld id="{AA0746AA-6444-41D4-ADB4-FD3977883641}" type="datetimeFigureOut">
               <a:rPr lang="en-US" smtClean="0"/>
               <a:pPr/>
-              <a:t>4/20/2019</a:t>
+              <a:t>4/29/19</a:t>
             </a:fld>
             <a:endParaRPr lang="en-CA"/>
           </a:p>
@@ -1955,7 +1976,7 @@
             <a:fld id="{AA0746AA-6444-41D4-ADB4-FD3977883641}" type="datetimeFigureOut">
               <a:rPr lang="en-US" smtClean="0"/>
               <a:pPr/>
-              <a:t>4/20/2019</a:t>
+              <a:t>4/29/19</a:t>
             </a:fld>
             <a:endParaRPr lang="en-CA"/>
           </a:p>
@@ -2054,7 +2075,7 @@
           </a:lstStyle>
           <a:p>
             <a:r>
-              <a:rPr lang="en-US" smtClean="0"/>
+              <a:rPr lang="en-US"/>
               <a:t>Click to edit Master title style</a:t>
             </a:r>
             <a:endParaRPr lang="en-CA"/>
@@ -2111,35 +2132,35 @@
           <a:p>
             <a:pPr lvl="0"/>
             <a:r>
-              <a:rPr lang="en-US" smtClean="0"/>
+              <a:rPr lang="en-US"/>
               <a:t>Click to edit Master text styles</a:t>
             </a:r>
           </a:p>
           <a:p>
             <a:pPr lvl="1"/>
             <a:r>
-              <a:rPr lang="en-US" smtClean="0"/>
+              <a:rPr lang="en-US"/>
               <a:t>Second level</a:t>
             </a:r>
           </a:p>
           <a:p>
             <a:pPr lvl="2"/>
             <a:r>
-              <a:rPr lang="en-US" smtClean="0"/>
+              <a:rPr lang="en-US"/>
               <a:t>Third level</a:t>
             </a:r>
           </a:p>
           <a:p>
             <a:pPr lvl="3"/>
             <a:r>
-              <a:rPr lang="en-US" smtClean="0"/>
+              <a:rPr lang="en-US"/>
               <a:t>Fourth level</a:t>
             </a:r>
           </a:p>
           <a:p>
             <a:pPr lvl="4"/>
             <a:r>
-              <a:rPr lang="en-US" smtClean="0"/>
+              <a:rPr lang="en-US"/>
               <a:t>Fifth level</a:t>
             </a:r>
             <a:endParaRPr lang="en-CA"/>
@@ -2205,7 +2226,7 @@
           <a:p>
             <a:pPr lvl="0"/>
             <a:r>
-              <a:rPr lang="en-US" smtClean="0"/>
+              <a:rPr lang="en-US"/>
               <a:t>Click to edit Master text styles</a:t>
             </a:r>
           </a:p>
@@ -2229,7 +2250,7 @@
             <a:fld id="{AA0746AA-6444-41D4-ADB4-FD3977883641}" type="datetimeFigureOut">
               <a:rPr lang="en-US" smtClean="0"/>
               <a:pPr/>
-              <a:t>4/20/2019</a:t>
+              <a:t>4/29/19</a:t>
             </a:fld>
             <a:endParaRPr lang="en-CA"/>
           </a:p>
@@ -2328,7 +2349,7 @@
           </a:lstStyle>
           <a:p>
             <a:r>
-              <a:rPr lang="en-US" smtClean="0"/>
+              <a:rPr lang="en-US"/>
               <a:t>Click to edit Master title style</a:t>
             </a:r>
             <a:endParaRPr lang="en-CA"/>
@@ -2455,7 +2476,7 @@
           <a:p>
             <a:pPr lvl="0"/>
             <a:r>
-              <a:rPr lang="en-US" smtClean="0"/>
+              <a:rPr lang="en-US"/>
               <a:t>Click to edit Master text styles</a:t>
             </a:r>
           </a:p>
@@ -2479,7 +2500,7 @@
             <a:fld id="{AA0746AA-6444-41D4-ADB4-FD3977883641}" type="datetimeFigureOut">
               <a:rPr lang="en-US" smtClean="0"/>
               <a:pPr/>
-              <a:t>4/20/2019</a:t>
+              <a:t>4/29/19</a:t>
             </a:fld>
             <a:endParaRPr lang="en-CA"/>
           </a:p>
@@ -2584,7 +2605,7 @@
           <a:lstStyle/>
           <a:p>
             <a:r>
-              <a:rPr lang="en-US" smtClean="0"/>
+              <a:rPr lang="en-US"/>
               <a:t>Click to edit Master title style</a:t>
             </a:r>
             <a:endParaRPr lang="en-CA"/>
@@ -2618,35 +2639,35 @@
           <a:p>
             <a:pPr lvl="0"/>
             <a:r>
-              <a:rPr lang="en-US" smtClean="0"/>
+              <a:rPr lang="en-US"/>
               <a:t>Click to edit Master text styles</a:t>
             </a:r>
           </a:p>
           <a:p>
             <a:pPr lvl="1"/>
             <a:r>
-              <a:rPr lang="en-US" smtClean="0"/>
+              <a:rPr lang="en-US"/>
               <a:t>Second level</a:t>
             </a:r>
           </a:p>
           <a:p>
             <a:pPr lvl="2"/>
             <a:r>
-              <a:rPr lang="en-US" smtClean="0"/>
+              <a:rPr lang="en-US"/>
               <a:t>Third level</a:t>
             </a:r>
           </a:p>
           <a:p>
             <a:pPr lvl="3"/>
             <a:r>
-              <a:rPr lang="en-US" smtClean="0"/>
+              <a:rPr lang="en-US"/>
               <a:t>Fourth level</a:t>
             </a:r>
           </a:p>
           <a:p>
             <a:pPr lvl="4"/>
             <a:r>
-              <a:rPr lang="en-US" smtClean="0"/>
+              <a:rPr lang="en-US"/>
               <a:t>Fifth level</a:t>
             </a:r>
             <a:endParaRPr lang="en-CA"/>
@@ -2689,7 +2710,7 @@
             <a:fld id="{AA0746AA-6444-41D4-ADB4-FD3977883641}" type="datetimeFigureOut">
               <a:rPr lang="en-US" smtClean="0"/>
               <a:pPr/>
-              <a:t>4/20/2019</a:t>
+              <a:t>4/29/19</a:t>
             </a:fld>
             <a:endParaRPr lang="en-CA"/>
           </a:p>
@@ -3414,10 +3435,9 @@
           <a:p>
             <a:pPr algn="ctr"/>
             <a:r>
-              <a:rPr lang="en-CA" dirty="0" smtClean="0"/>
+              <a:rPr lang="en-CA" dirty="0"/>
               <a:t>Prediction: Squatting</a:t>
             </a:r>
-            <a:endParaRPr lang="en-CA" dirty="0"/>
           </a:p>
         </p:txBody>
       </p:sp>
@@ -3430,6 +3450,2169 @@
 </file>
 
 <file path=ppt/slides/slide2.xml><?xml version="1.0" encoding="utf-8"?>
+<p:sld xmlns:a="http://schemas.openxmlformats.org/drawingml/2006/main" xmlns:r="http://schemas.openxmlformats.org/officeDocument/2006/relationships" xmlns:p="http://schemas.openxmlformats.org/presentationml/2006/main">
+  <p:cSld>
+    <p:spTree>
+      <p:nvGrpSpPr>
+        <p:cNvPr id="1" name=""/>
+        <p:cNvGrpSpPr/>
+        <p:nvPr/>
+      </p:nvGrpSpPr>
+      <p:grpSpPr>
+        <a:xfrm>
+          <a:off x="0" y="0"/>
+          <a:ext cx="0" cy="0"/>
+          <a:chOff x="0" y="0"/>
+          <a:chExt cx="0" cy="0"/>
+        </a:xfrm>
+      </p:grpSpPr>
+      <p:grpSp>
+        <p:nvGrpSpPr>
+          <p:cNvPr id="2" name="Group 1">
+            <a:extLst>
+              <a:ext uri="{FF2B5EF4-FFF2-40B4-BE49-F238E27FC236}">
+                <a16:creationId xmlns:a16="http://schemas.microsoft.com/office/drawing/2014/main" id="{C8ECB436-0F24-074B-A411-D4B021AF7FF6}"/>
+              </a:ext>
+            </a:extLst>
+          </p:cNvPr>
+          <p:cNvGrpSpPr/>
+          <p:nvPr/>
+        </p:nvGrpSpPr>
+        <p:grpSpPr>
+          <a:xfrm>
+            <a:off x="284552" y="583783"/>
+            <a:ext cx="3786214" cy="5143536"/>
+            <a:chOff x="284552" y="583783"/>
+            <a:chExt cx="3786214" cy="5143536"/>
+          </a:xfrm>
+        </p:grpSpPr>
+        <p:sp>
+          <p:nvSpPr>
+            <p:cNvPr id="38" name="Rectangle 37">
+              <a:extLst>
+                <a:ext uri="{FF2B5EF4-FFF2-40B4-BE49-F238E27FC236}">
+                  <a16:creationId xmlns:a16="http://schemas.microsoft.com/office/drawing/2014/main" id="{E3107784-A691-8A40-A4B1-A9AEF745FE60}"/>
+                </a:ext>
+              </a:extLst>
+            </p:cNvPr>
+            <p:cNvSpPr/>
+            <p:nvPr/>
+          </p:nvSpPr>
+          <p:spPr>
+            <a:xfrm>
+              <a:off x="284552" y="583783"/>
+              <a:ext cx="3786214" cy="5143536"/>
+            </a:xfrm>
+            <a:prstGeom prst="rect">
+              <a:avLst/>
+            </a:prstGeom>
+            <a:solidFill>
+              <a:schemeClr val="bg1"/>
+            </a:solidFill>
+            <a:ln>
+              <a:solidFill>
+                <a:schemeClr val="accent1">
+                  <a:shade val="50000"/>
+                </a:schemeClr>
+              </a:solidFill>
+            </a:ln>
+          </p:spPr>
+          <p:style>
+            <a:lnRef idx="2">
+              <a:schemeClr val="accent1">
+                <a:shade val="50000"/>
+              </a:schemeClr>
+            </a:lnRef>
+            <a:fillRef idx="1">
+              <a:schemeClr val="accent1"/>
+            </a:fillRef>
+            <a:effectRef idx="0">
+              <a:schemeClr val="accent1"/>
+            </a:effectRef>
+            <a:fontRef idx="minor">
+              <a:schemeClr val="lt1"/>
+            </a:fontRef>
+          </p:style>
+          <p:txBody>
+            <a:bodyPr rtlCol="0" anchor="ctr"/>
+            <a:lstStyle/>
+            <a:p>
+              <a:pPr algn="ctr"/>
+              <a:endParaRPr lang="en-CA"/>
+            </a:p>
+          </p:txBody>
+        </p:sp>
+        <p:grpSp>
+          <p:nvGrpSpPr>
+            <p:cNvPr id="25" name="Group 24">
+              <a:extLst>
+                <a:ext uri="{FF2B5EF4-FFF2-40B4-BE49-F238E27FC236}">
+                  <a16:creationId xmlns:a16="http://schemas.microsoft.com/office/drawing/2014/main" id="{39C3340C-5D0E-1740-BB22-549A56B3B23D}"/>
+                </a:ext>
+              </a:extLst>
+            </p:cNvPr>
+            <p:cNvGrpSpPr>
+              <a:grpSpLocks noChangeAspect="1"/>
+            </p:cNvGrpSpPr>
+            <p:nvPr/>
+          </p:nvGrpSpPr>
+          <p:grpSpPr>
+            <a:xfrm>
+              <a:off x="1763336" y="834263"/>
+              <a:ext cx="828646" cy="4654800"/>
+              <a:chOff x="2058735" y="834264"/>
+              <a:chExt cx="633542" cy="3558831"/>
+            </a:xfrm>
+          </p:grpSpPr>
+          <p:sp>
+            <p:nvSpPr>
+              <p:cNvPr id="26" name="Rounded Rectangle 25">
+                <a:extLst>
+                  <a:ext uri="{FF2B5EF4-FFF2-40B4-BE49-F238E27FC236}">
+                    <a16:creationId xmlns:a16="http://schemas.microsoft.com/office/drawing/2014/main" id="{6BC79FE8-EE82-974F-BCFA-B524724AFDB9}"/>
+                  </a:ext>
+                </a:extLst>
+              </p:cNvPr>
+              <p:cNvSpPr/>
+              <p:nvPr/>
+            </p:nvSpPr>
+            <p:spPr>
+              <a:xfrm>
+                <a:off x="2276765" y="3141955"/>
+                <a:ext cx="268357" cy="1231263"/>
+              </a:xfrm>
+              <a:prstGeom prst="roundRect">
+                <a:avLst>
+                  <a:gd name="adj" fmla="val 50000"/>
+                </a:avLst>
+              </a:prstGeom>
+              <a:solidFill>
+                <a:schemeClr val="accent1"/>
+              </a:solidFill>
+              <a:ln>
+                <a:noFill/>
+              </a:ln>
+            </p:spPr>
+            <p:style>
+              <a:lnRef idx="2">
+                <a:schemeClr val="accent1">
+                  <a:shade val="50000"/>
+                </a:schemeClr>
+              </a:lnRef>
+              <a:fillRef idx="1">
+                <a:schemeClr val="accent1"/>
+              </a:fillRef>
+              <a:effectRef idx="0">
+                <a:schemeClr val="accent1"/>
+              </a:effectRef>
+              <a:fontRef idx="minor">
+                <a:schemeClr val="lt1"/>
+              </a:fontRef>
+            </p:style>
+            <p:txBody>
+              <a:bodyPr rtlCol="0" anchor="ctr"/>
+              <a:lstStyle/>
+              <a:p>
+                <a:pPr algn="ctr"/>
+                <a:endParaRPr lang="en-US"/>
+              </a:p>
+            </p:txBody>
+          </p:sp>
+          <p:sp>
+            <p:nvSpPr>
+              <p:cNvPr id="27" name="Rounded Rectangle 26">
+                <a:extLst>
+                  <a:ext uri="{FF2B5EF4-FFF2-40B4-BE49-F238E27FC236}">
+                    <a16:creationId xmlns:a16="http://schemas.microsoft.com/office/drawing/2014/main" id="{252FE273-DB34-0448-B326-6C87671BB4F4}"/>
+                  </a:ext>
+                </a:extLst>
+              </p:cNvPr>
+              <p:cNvSpPr/>
+              <p:nvPr/>
+            </p:nvSpPr>
+            <p:spPr>
+              <a:xfrm>
+                <a:off x="2182346" y="3161832"/>
+                <a:ext cx="268357" cy="1231263"/>
+              </a:xfrm>
+              <a:prstGeom prst="roundRect">
+                <a:avLst>
+                  <a:gd name="adj" fmla="val 50000"/>
+                </a:avLst>
+              </a:prstGeom>
+              <a:solidFill>
+                <a:schemeClr val="accent1"/>
+              </a:solidFill>
+              <a:ln w="28575">
+                <a:solidFill>
+                  <a:schemeClr val="bg1"/>
+                </a:solidFill>
+              </a:ln>
+            </p:spPr>
+            <p:style>
+              <a:lnRef idx="2">
+                <a:schemeClr val="accent1">
+                  <a:shade val="50000"/>
+                </a:schemeClr>
+              </a:lnRef>
+              <a:fillRef idx="1">
+                <a:schemeClr val="accent1"/>
+              </a:fillRef>
+              <a:effectRef idx="0">
+                <a:schemeClr val="accent1"/>
+              </a:effectRef>
+              <a:fontRef idx="minor">
+                <a:schemeClr val="lt1"/>
+              </a:fontRef>
+            </p:style>
+            <p:txBody>
+              <a:bodyPr rtlCol="0" anchor="ctr"/>
+              <a:lstStyle/>
+              <a:p>
+                <a:pPr algn="ctr"/>
+                <a:endParaRPr lang="en-US"/>
+              </a:p>
+            </p:txBody>
+          </p:sp>
+          <p:sp>
+            <p:nvSpPr>
+              <p:cNvPr id="28" name="Oval 27">
+                <a:extLst>
+                  <a:ext uri="{FF2B5EF4-FFF2-40B4-BE49-F238E27FC236}">
+                    <a16:creationId xmlns:a16="http://schemas.microsoft.com/office/drawing/2014/main" id="{6403FFCA-2264-E649-900B-97DB3EBF4E71}"/>
+                  </a:ext>
+                </a:extLst>
+              </p:cNvPr>
+              <p:cNvSpPr/>
+              <p:nvPr/>
+            </p:nvSpPr>
+            <p:spPr>
+              <a:xfrm>
+                <a:off x="2058735" y="834264"/>
+                <a:ext cx="633542" cy="633542"/>
+              </a:xfrm>
+              <a:prstGeom prst="ellipse">
+                <a:avLst/>
+              </a:prstGeom>
+              <a:solidFill>
+                <a:schemeClr val="accent1"/>
+              </a:solidFill>
+              <a:ln>
+                <a:noFill/>
+              </a:ln>
+            </p:spPr>
+            <p:style>
+              <a:lnRef idx="2">
+                <a:schemeClr val="accent1">
+                  <a:shade val="50000"/>
+                </a:schemeClr>
+              </a:lnRef>
+              <a:fillRef idx="1">
+                <a:schemeClr val="accent1"/>
+              </a:fillRef>
+              <a:effectRef idx="0">
+                <a:schemeClr val="accent1"/>
+              </a:effectRef>
+              <a:fontRef idx="minor">
+                <a:schemeClr val="lt1"/>
+              </a:fontRef>
+            </p:style>
+            <p:txBody>
+              <a:bodyPr rtlCol="0" anchor="ctr"/>
+              <a:lstStyle/>
+              <a:p>
+                <a:pPr algn="ctr"/>
+                <a:endParaRPr lang="en-US"/>
+              </a:p>
+            </p:txBody>
+          </p:sp>
+          <p:sp>
+            <p:nvSpPr>
+              <p:cNvPr id="29" name="Rounded Rectangle 28">
+                <a:extLst>
+                  <a:ext uri="{FF2B5EF4-FFF2-40B4-BE49-F238E27FC236}">
+                    <a16:creationId xmlns:a16="http://schemas.microsoft.com/office/drawing/2014/main" id="{E0A78167-353C-3F47-9FB6-2E3AF67823C4}"/>
+                  </a:ext>
+                </a:extLst>
+              </p:cNvPr>
+              <p:cNvSpPr/>
+              <p:nvPr/>
+            </p:nvSpPr>
+            <p:spPr>
+              <a:xfrm>
+                <a:off x="2074072" y="1544364"/>
+                <a:ext cx="602868" cy="1739348"/>
+              </a:xfrm>
+              <a:prstGeom prst="roundRect">
+                <a:avLst/>
+              </a:prstGeom>
+              <a:solidFill>
+                <a:schemeClr val="accent1"/>
+              </a:solidFill>
+              <a:ln>
+                <a:noFill/>
+              </a:ln>
+            </p:spPr>
+            <p:style>
+              <a:lnRef idx="2">
+                <a:schemeClr val="accent1">
+                  <a:shade val="50000"/>
+                </a:schemeClr>
+              </a:lnRef>
+              <a:fillRef idx="1">
+                <a:schemeClr val="accent1"/>
+              </a:fillRef>
+              <a:effectRef idx="0">
+                <a:schemeClr val="accent1"/>
+              </a:effectRef>
+              <a:fontRef idx="minor">
+                <a:schemeClr val="lt1"/>
+              </a:fontRef>
+            </p:style>
+            <p:txBody>
+              <a:bodyPr rtlCol="0" anchor="ctr"/>
+              <a:lstStyle/>
+              <a:p>
+                <a:pPr algn="ctr"/>
+                <a:endParaRPr lang="en-US"/>
+              </a:p>
+            </p:txBody>
+          </p:sp>
+          <p:sp>
+            <p:nvSpPr>
+              <p:cNvPr id="30" name="Rounded Rectangle 29">
+                <a:extLst>
+                  <a:ext uri="{FF2B5EF4-FFF2-40B4-BE49-F238E27FC236}">
+                    <a16:creationId xmlns:a16="http://schemas.microsoft.com/office/drawing/2014/main" id="{14AF16CB-C264-E642-9CD9-6369BBD63A03}"/>
+                  </a:ext>
+                </a:extLst>
+              </p:cNvPr>
+              <p:cNvSpPr/>
+              <p:nvPr/>
+            </p:nvSpPr>
+            <p:spPr>
+              <a:xfrm>
+                <a:off x="2277796" y="1700897"/>
+                <a:ext cx="195419" cy="944217"/>
+              </a:xfrm>
+              <a:prstGeom prst="roundRect">
+                <a:avLst>
+                  <a:gd name="adj" fmla="val 50000"/>
+                </a:avLst>
+              </a:prstGeom>
+              <a:solidFill>
+                <a:schemeClr val="accent1"/>
+              </a:solidFill>
+              <a:ln w="28575">
+                <a:solidFill>
+                  <a:schemeClr val="bg1"/>
+                </a:solidFill>
+              </a:ln>
+            </p:spPr>
+            <p:style>
+              <a:lnRef idx="2">
+                <a:schemeClr val="accent1">
+                  <a:shade val="50000"/>
+                </a:schemeClr>
+              </a:lnRef>
+              <a:fillRef idx="1">
+                <a:schemeClr val="accent1"/>
+              </a:fillRef>
+              <a:effectRef idx="0">
+                <a:schemeClr val="accent1"/>
+              </a:effectRef>
+              <a:fontRef idx="minor">
+                <a:schemeClr val="lt1"/>
+              </a:fontRef>
+            </p:style>
+            <p:txBody>
+              <a:bodyPr rtlCol="0" anchor="ctr"/>
+              <a:lstStyle/>
+              <a:p>
+                <a:pPr algn="ctr"/>
+                <a:endParaRPr lang="en-US"/>
+              </a:p>
+            </p:txBody>
+          </p:sp>
+        </p:grpSp>
+      </p:grpSp>
+    </p:spTree>
+    <p:extLst>
+      <p:ext uri="{BB962C8B-B14F-4D97-AF65-F5344CB8AC3E}">
+        <p14:creationId xmlns:p14="http://schemas.microsoft.com/office/powerpoint/2010/main" val="2681554707"/>
+      </p:ext>
+    </p:extLst>
+  </p:cSld>
+  <p:clrMapOvr>
+    <a:masterClrMapping/>
+  </p:clrMapOvr>
+</p:sld>
+</file>
+
+<file path=ppt/slides/slide3.xml><?xml version="1.0" encoding="utf-8"?>
+<p:sld xmlns:a="http://schemas.openxmlformats.org/drawingml/2006/main" xmlns:r="http://schemas.openxmlformats.org/officeDocument/2006/relationships" xmlns:p="http://schemas.openxmlformats.org/presentationml/2006/main">
+  <p:cSld>
+    <p:spTree>
+      <p:nvGrpSpPr>
+        <p:cNvPr id="1" name=""/>
+        <p:cNvGrpSpPr/>
+        <p:nvPr/>
+      </p:nvGrpSpPr>
+      <p:grpSpPr>
+        <a:xfrm>
+          <a:off x="0" y="0"/>
+          <a:ext cx="0" cy="0"/>
+          <a:chOff x="0" y="0"/>
+          <a:chExt cx="0" cy="0"/>
+        </a:xfrm>
+      </p:grpSpPr>
+      <p:grpSp>
+        <p:nvGrpSpPr>
+          <p:cNvPr id="2" name="Group 1">
+            <a:extLst>
+              <a:ext uri="{FF2B5EF4-FFF2-40B4-BE49-F238E27FC236}">
+                <a16:creationId xmlns:a16="http://schemas.microsoft.com/office/drawing/2014/main" id="{FAF751CD-F5EB-9E4C-A58C-2F444E773380}"/>
+              </a:ext>
+            </a:extLst>
+          </p:cNvPr>
+          <p:cNvGrpSpPr/>
+          <p:nvPr/>
+        </p:nvGrpSpPr>
+        <p:grpSpPr>
+          <a:xfrm>
+            <a:off x="284552" y="583783"/>
+            <a:ext cx="3786214" cy="5143536"/>
+            <a:chOff x="284552" y="583783"/>
+            <a:chExt cx="3786214" cy="5143536"/>
+          </a:xfrm>
+        </p:grpSpPr>
+        <p:sp>
+          <p:nvSpPr>
+            <p:cNvPr id="38" name="Rectangle 37">
+              <a:extLst>
+                <a:ext uri="{FF2B5EF4-FFF2-40B4-BE49-F238E27FC236}">
+                  <a16:creationId xmlns:a16="http://schemas.microsoft.com/office/drawing/2014/main" id="{E3107784-A691-8A40-A4B1-A9AEF745FE60}"/>
+                </a:ext>
+              </a:extLst>
+            </p:cNvPr>
+            <p:cNvSpPr/>
+            <p:nvPr/>
+          </p:nvSpPr>
+          <p:spPr>
+            <a:xfrm>
+              <a:off x="284552" y="583783"/>
+              <a:ext cx="3786214" cy="5143536"/>
+            </a:xfrm>
+            <a:prstGeom prst="rect">
+              <a:avLst/>
+            </a:prstGeom>
+            <a:solidFill>
+              <a:schemeClr val="bg1"/>
+            </a:solidFill>
+            <a:ln>
+              <a:solidFill>
+                <a:schemeClr val="accent1">
+                  <a:shade val="50000"/>
+                </a:schemeClr>
+              </a:solidFill>
+            </a:ln>
+          </p:spPr>
+          <p:style>
+            <a:lnRef idx="2">
+              <a:schemeClr val="accent1">
+                <a:shade val="50000"/>
+              </a:schemeClr>
+            </a:lnRef>
+            <a:fillRef idx="1">
+              <a:schemeClr val="accent1"/>
+            </a:fillRef>
+            <a:effectRef idx="0">
+              <a:schemeClr val="accent1"/>
+            </a:effectRef>
+            <a:fontRef idx="minor">
+              <a:schemeClr val="lt1"/>
+            </a:fontRef>
+          </p:style>
+          <p:txBody>
+            <a:bodyPr rtlCol="0" anchor="ctr"/>
+            <a:lstStyle/>
+            <a:p>
+              <a:pPr algn="ctr"/>
+              <a:endParaRPr lang="en-CA"/>
+            </a:p>
+          </p:txBody>
+        </p:sp>
+        <p:grpSp>
+          <p:nvGrpSpPr>
+            <p:cNvPr id="31" name="Group 30">
+              <a:extLst>
+                <a:ext uri="{FF2B5EF4-FFF2-40B4-BE49-F238E27FC236}">
+                  <a16:creationId xmlns:a16="http://schemas.microsoft.com/office/drawing/2014/main" id="{4A984E90-14FB-764F-9A03-CD1C8349D941}"/>
+                </a:ext>
+              </a:extLst>
+            </p:cNvPr>
+            <p:cNvGrpSpPr>
+              <a:grpSpLocks noChangeAspect="1"/>
+            </p:cNvGrpSpPr>
+            <p:nvPr/>
+          </p:nvGrpSpPr>
+          <p:grpSpPr>
+            <a:xfrm>
+              <a:off x="1763688" y="828151"/>
+              <a:ext cx="1572173" cy="4654800"/>
+              <a:chOff x="2058735" y="834264"/>
+              <a:chExt cx="1202006" cy="3558831"/>
+            </a:xfrm>
+          </p:grpSpPr>
+          <p:sp>
+            <p:nvSpPr>
+              <p:cNvPr id="32" name="Rounded Rectangle 31">
+                <a:extLst>
+                  <a:ext uri="{FF2B5EF4-FFF2-40B4-BE49-F238E27FC236}">
+                    <a16:creationId xmlns:a16="http://schemas.microsoft.com/office/drawing/2014/main" id="{84965935-4821-7644-A1E4-5D86997F487D}"/>
+                  </a:ext>
+                </a:extLst>
+              </p:cNvPr>
+              <p:cNvSpPr/>
+              <p:nvPr/>
+            </p:nvSpPr>
+            <p:spPr>
+              <a:xfrm>
+                <a:off x="2276765" y="3141955"/>
+                <a:ext cx="268357" cy="1231263"/>
+              </a:xfrm>
+              <a:prstGeom prst="roundRect">
+                <a:avLst>
+                  <a:gd name="adj" fmla="val 50000"/>
+                </a:avLst>
+              </a:prstGeom>
+              <a:solidFill>
+                <a:schemeClr val="accent1"/>
+              </a:solidFill>
+              <a:ln>
+                <a:noFill/>
+              </a:ln>
+            </p:spPr>
+            <p:style>
+              <a:lnRef idx="2">
+                <a:schemeClr val="accent1">
+                  <a:shade val="50000"/>
+                </a:schemeClr>
+              </a:lnRef>
+              <a:fillRef idx="1">
+                <a:schemeClr val="accent1"/>
+              </a:fillRef>
+              <a:effectRef idx="0">
+                <a:schemeClr val="accent1"/>
+              </a:effectRef>
+              <a:fontRef idx="minor">
+                <a:schemeClr val="lt1"/>
+              </a:fontRef>
+            </p:style>
+            <p:txBody>
+              <a:bodyPr rtlCol="0" anchor="ctr"/>
+              <a:lstStyle/>
+              <a:p>
+                <a:pPr algn="ctr"/>
+                <a:endParaRPr lang="en-US"/>
+              </a:p>
+            </p:txBody>
+          </p:sp>
+          <p:sp>
+            <p:nvSpPr>
+              <p:cNvPr id="33" name="Rounded Rectangle 32">
+                <a:extLst>
+                  <a:ext uri="{FF2B5EF4-FFF2-40B4-BE49-F238E27FC236}">
+                    <a16:creationId xmlns:a16="http://schemas.microsoft.com/office/drawing/2014/main" id="{C99B8409-DCCF-9447-B668-2567CBE7DE82}"/>
+                  </a:ext>
+                </a:extLst>
+              </p:cNvPr>
+              <p:cNvSpPr/>
+              <p:nvPr/>
+            </p:nvSpPr>
+            <p:spPr>
+              <a:xfrm>
+                <a:off x="2182346" y="3161832"/>
+                <a:ext cx="268357" cy="1231263"/>
+              </a:xfrm>
+              <a:prstGeom prst="roundRect">
+                <a:avLst>
+                  <a:gd name="adj" fmla="val 50000"/>
+                </a:avLst>
+              </a:prstGeom>
+              <a:solidFill>
+                <a:schemeClr val="accent1"/>
+              </a:solidFill>
+              <a:ln w="28575">
+                <a:solidFill>
+                  <a:schemeClr val="bg1"/>
+                </a:solidFill>
+              </a:ln>
+            </p:spPr>
+            <p:style>
+              <a:lnRef idx="2">
+                <a:schemeClr val="accent1">
+                  <a:shade val="50000"/>
+                </a:schemeClr>
+              </a:lnRef>
+              <a:fillRef idx="1">
+                <a:schemeClr val="accent1"/>
+              </a:fillRef>
+              <a:effectRef idx="0">
+                <a:schemeClr val="accent1"/>
+              </a:effectRef>
+              <a:fontRef idx="minor">
+                <a:schemeClr val="lt1"/>
+              </a:fontRef>
+            </p:style>
+            <p:txBody>
+              <a:bodyPr rtlCol="0" anchor="ctr"/>
+              <a:lstStyle/>
+              <a:p>
+                <a:pPr algn="ctr"/>
+                <a:endParaRPr lang="en-US"/>
+              </a:p>
+            </p:txBody>
+          </p:sp>
+          <p:sp>
+            <p:nvSpPr>
+              <p:cNvPr id="35" name="Rounded Rectangle 34">
+                <a:extLst>
+                  <a:ext uri="{FF2B5EF4-FFF2-40B4-BE49-F238E27FC236}">
+                    <a16:creationId xmlns:a16="http://schemas.microsoft.com/office/drawing/2014/main" id="{93340051-11C9-1A4E-A1C8-DC53229DCEC8}"/>
+                  </a:ext>
+                </a:extLst>
+              </p:cNvPr>
+              <p:cNvSpPr/>
+              <p:nvPr/>
+            </p:nvSpPr>
+            <p:spPr>
+              <a:xfrm>
+                <a:off x="2074072" y="1544364"/>
+                <a:ext cx="602868" cy="1739348"/>
+              </a:xfrm>
+              <a:prstGeom prst="roundRect">
+                <a:avLst/>
+              </a:prstGeom>
+              <a:solidFill>
+                <a:schemeClr val="accent1"/>
+              </a:solidFill>
+              <a:ln>
+                <a:noFill/>
+              </a:ln>
+            </p:spPr>
+            <p:style>
+              <a:lnRef idx="2">
+                <a:schemeClr val="accent1">
+                  <a:shade val="50000"/>
+                </a:schemeClr>
+              </a:lnRef>
+              <a:fillRef idx="1">
+                <a:schemeClr val="accent1"/>
+              </a:fillRef>
+              <a:effectRef idx="0">
+                <a:schemeClr val="accent1"/>
+              </a:effectRef>
+              <a:fontRef idx="minor">
+                <a:schemeClr val="lt1"/>
+              </a:fontRef>
+            </p:style>
+            <p:txBody>
+              <a:bodyPr rtlCol="0" anchor="ctr"/>
+              <a:lstStyle/>
+              <a:p>
+                <a:pPr algn="ctr"/>
+                <a:endParaRPr lang="en-US"/>
+              </a:p>
+            </p:txBody>
+          </p:sp>
+          <p:sp>
+            <p:nvSpPr>
+              <p:cNvPr id="34" name="Oval 33">
+                <a:extLst>
+                  <a:ext uri="{FF2B5EF4-FFF2-40B4-BE49-F238E27FC236}">
+                    <a16:creationId xmlns:a16="http://schemas.microsoft.com/office/drawing/2014/main" id="{6F9B2BE0-9D67-514A-9272-4D781EB79DF6}"/>
+                  </a:ext>
+                </a:extLst>
+              </p:cNvPr>
+              <p:cNvSpPr/>
+              <p:nvPr/>
+            </p:nvSpPr>
+            <p:spPr>
+              <a:xfrm>
+                <a:off x="2058735" y="834264"/>
+                <a:ext cx="633542" cy="633542"/>
+              </a:xfrm>
+              <a:prstGeom prst="ellipse">
+                <a:avLst/>
+              </a:prstGeom>
+              <a:solidFill>
+                <a:schemeClr val="accent1"/>
+              </a:solidFill>
+              <a:ln>
+                <a:noFill/>
+              </a:ln>
+            </p:spPr>
+            <p:style>
+              <a:lnRef idx="2">
+                <a:schemeClr val="accent1">
+                  <a:shade val="50000"/>
+                </a:schemeClr>
+              </a:lnRef>
+              <a:fillRef idx="1">
+                <a:schemeClr val="accent1"/>
+              </a:fillRef>
+              <a:effectRef idx="0">
+                <a:schemeClr val="accent1"/>
+              </a:effectRef>
+              <a:fontRef idx="minor">
+                <a:schemeClr val="lt1"/>
+              </a:fontRef>
+            </p:style>
+            <p:txBody>
+              <a:bodyPr rtlCol="0" anchor="ctr"/>
+              <a:lstStyle/>
+              <a:p>
+                <a:pPr algn="ctr"/>
+                <a:endParaRPr lang="en-US"/>
+              </a:p>
+            </p:txBody>
+          </p:sp>
+          <p:sp>
+            <p:nvSpPr>
+              <p:cNvPr id="36" name="Rounded Rectangle 35">
+                <a:extLst>
+                  <a:ext uri="{FF2B5EF4-FFF2-40B4-BE49-F238E27FC236}">
+                    <a16:creationId xmlns:a16="http://schemas.microsoft.com/office/drawing/2014/main" id="{F05AB463-8EC3-3448-9C7E-C7FE8B50E2D4}"/>
+                  </a:ext>
+                </a:extLst>
+              </p:cNvPr>
+              <p:cNvSpPr/>
+              <p:nvPr/>
+            </p:nvSpPr>
+            <p:spPr>
+              <a:xfrm rot="16200000">
+                <a:off x="2690923" y="1345031"/>
+                <a:ext cx="195419" cy="944217"/>
+              </a:xfrm>
+              <a:prstGeom prst="roundRect">
+                <a:avLst>
+                  <a:gd name="adj" fmla="val 50000"/>
+                </a:avLst>
+              </a:prstGeom>
+              <a:solidFill>
+                <a:schemeClr val="accent1"/>
+              </a:solidFill>
+              <a:ln w="28575">
+                <a:solidFill>
+                  <a:schemeClr val="bg1"/>
+                </a:solidFill>
+              </a:ln>
+            </p:spPr>
+            <p:style>
+              <a:lnRef idx="2">
+                <a:schemeClr val="accent1">
+                  <a:shade val="50000"/>
+                </a:schemeClr>
+              </a:lnRef>
+              <a:fillRef idx="1">
+                <a:schemeClr val="accent1"/>
+              </a:fillRef>
+              <a:effectRef idx="0">
+                <a:schemeClr val="accent1"/>
+              </a:effectRef>
+              <a:fontRef idx="minor">
+                <a:schemeClr val="lt1"/>
+              </a:fontRef>
+            </p:style>
+            <p:txBody>
+              <a:bodyPr rtlCol="0" anchor="ctr"/>
+              <a:lstStyle/>
+              <a:p>
+                <a:pPr algn="ctr"/>
+                <a:endParaRPr lang="en-US"/>
+              </a:p>
+            </p:txBody>
+          </p:sp>
+        </p:grpSp>
+      </p:grpSp>
+    </p:spTree>
+    <p:extLst>
+      <p:ext uri="{BB962C8B-B14F-4D97-AF65-F5344CB8AC3E}">
+        <p14:creationId xmlns:p14="http://schemas.microsoft.com/office/powerpoint/2010/main" val="2235374843"/>
+      </p:ext>
+    </p:extLst>
+  </p:cSld>
+  <p:clrMapOvr>
+    <a:masterClrMapping/>
+  </p:clrMapOvr>
+</p:sld>
+</file>
+
+<file path=ppt/slides/slide4.xml><?xml version="1.0" encoding="utf-8"?>
+<p:sld xmlns:a="http://schemas.openxmlformats.org/drawingml/2006/main" xmlns:r="http://schemas.openxmlformats.org/officeDocument/2006/relationships" xmlns:p="http://schemas.openxmlformats.org/presentationml/2006/main">
+  <p:cSld>
+    <p:spTree>
+      <p:nvGrpSpPr>
+        <p:cNvPr id="1" name=""/>
+        <p:cNvGrpSpPr/>
+        <p:nvPr/>
+      </p:nvGrpSpPr>
+      <p:grpSpPr>
+        <a:xfrm>
+          <a:off x="0" y="0"/>
+          <a:ext cx="0" cy="0"/>
+          <a:chOff x="0" y="0"/>
+          <a:chExt cx="0" cy="0"/>
+        </a:xfrm>
+      </p:grpSpPr>
+      <p:grpSp>
+        <p:nvGrpSpPr>
+          <p:cNvPr id="2" name="Group 1">
+            <a:extLst>
+              <a:ext uri="{FF2B5EF4-FFF2-40B4-BE49-F238E27FC236}">
+                <a16:creationId xmlns:a16="http://schemas.microsoft.com/office/drawing/2014/main" id="{0E0D272E-21D0-394A-95DF-1A44B40FCD50}"/>
+              </a:ext>
+            </a:extLst>
+          </p:cNvPr>
+          <p:cNvGrpSpPr/>
+          <p:nvPr/>
+        </p:nvGrpSpPr>
+        <p:grpSpPr>
+          <a:xfrm>
+            <a:off x="284552" y="583783"/>
+            <a:ext cx="3786214" cy="5143536"/>
+            <a:chOff x="284552" y="583783"/>
+            <a:chExt cx="3786214" cy="5143536"/>
+          </a:xfrm>
+        </p:grpSpPr>
+        <p:sp>
+          <p:nvSpPr>
+            <p:cNvPr id="38" name="Rectangle 37">
+              <a:extLst>
+                <a:ext uri="{FF2B5EF4-FFF2-40B4-BE49-F238E27FC236}">
+                  <a16:creationId xmlns:a16="http://schemas.microsoft.com/office/drawing/2014/main" id="{E3107784-A691-8A40-A4B1-A9AEF745FE60}"/>
+                </a:ext>
+              </a:extLst>
+            </p:cNvPr>
+            <p:cNvSpPr/>
+            <p:nvPr/>
+          </p:nvSpPr>
+          <p:spPr>
+            <a:xfrm>
+              <a:off x="284552" y="583783"/>
+              <a:ext cx="3786214" cy="5143536"/>
+            </a:xfrm>
+            <a:prstGeom prst="rect">
+              <a:avLst/>
+            </a:prstGeom>
+            <a:solidFill>
+              <a:schemeClr val="bg1"/>
+            </a:solidFill>
+            <a:ln>
+              <a:solidFill>
+                <a:schemeClr val="accent1">
+                  <a:shade val="50000"/>
+                </a:schemeClr>
+              </a:solidFill>
+            </a:ln>
+          </p:spPr>
+          <p:style>
+            <a:lnRef idx="2">
+              <a:schemeClr val="accent1">
+                <a:shade val="50000"/>
+              </a:schemeClr>
+            </a:lnRef>
+            <a:fillRef idx="1">
+              <a:schemeClr val="accent1"/>
+            </a:fillRef>
+            <a:effectRef idx="0">
+              <a:schemeClr val="accent1"/>
+            </a:effectRef>
+            <a:fontRef idx="minor">
+              <a:schemeClr val="lt1"/>
+            </a:fontRef>
+          </p:style>
+          <p:txBody>
+            <a:bodyPr rtlCol="0" anchor="ctr"/>
+            <a:lstStyle/>
+            <a:p>
+              <a:pPr algn="ctr"/>
+              <a:endParaRPr lang="en-CA"/>
+            </a:p>
+          </p:txBody>
+        </p:sp>
+        <p:grpSp>
+          <p:nvGrpSpPr>
+            <p:cNvPr id="4" name="Group 3">
+              <a:extLst>
+                <a:ext uri="{FF2B5EF4-FFF2-40B4-BE49-F238E27FC236}">
+                  <a16:creationId xmlns:a16="http://schemas.microsoft.com/office/drawing/2014/main" id="{0021D746-E494-D943-A8A8-3DDBFBE32918}"/>
+                </a:ext>
+              </a:extLst>
+            </p:cNvPr>
+            <p:cNvGrpSpPr>
+              <a:grpSpLocks noChangeAspect="1"/>
+            </p:cNvGrpSpPr>
+            <p:nvPr/>
+          </p:nvGrpSpPr>
+          <p:grpSpPr>
+            <a:xfrm>
+              <a:off x="1763688" y="834263"/>
+              <a:ext cx="816535" cy="4654800"/>
+              <a:chOff x="3082465" y="834264"/>
+              <a:chExt cx="633542" cy="3611615"/>
+            </a:xfrm>
+          </p:grpSpPr>
+          <p:sp>
+            <p:nvSpPr>
+              <p:cNvPr id="5" name="Oval 4">
+                <a:extLst>
+                  <a:ext uri="{FF2B5EF4-FFF2-40B4-BE49-F238E27FC236}">
+                    <a16:creationId xmlns:a16="http://schemas.microsoft.com/office/drawing/2014/main" id="{1EA04978-24A2-8F48-B537-DCCE954FA5AA}"/>
+                  </a:ext>
+                </a:extLst>
+              </p:cNvPr>
+              <p:cNvSpPr/>
+              <p:nvPr/>
+            </p:nvSpPr>
+            <p:spPr>
+              <a:xfrm>
+                <a:off x="3082465" y="834264"/>
+                <a:ext cx="633542" cy="633542"/>
+              </a:xfrm>
+              <a:prstGeom prst="ellipse">
+                <a:avLst/>
+              </a:prstGeom>
+              <a:solidFill>
+                <a:schemeClr val="accent1"/>
+              </a:solidFill>
+              <a:ln>
+                <a:noFill/>
+              </a:ln>
+            </p:spPr>
+            <p:style>
+              <a:lnRef idx="2">
+                <a:schemeClr val="accent1">
+                  <a:shade val="50000"/>
+                </a:schemeClr>
+              </a:lnRef>
+              <a:fillRef idx="1">
+                <a:schemeClr val="accent1"/>
+              </a:fillRef>
+              <a:effectRef idx="0">
+                <a:schemeClr val="accent1"/>
+              </a:effectRef>
+              <a:fontRef idx="minor">
+                <a:schemeClr val="lt1"/>
+              </a:fontRef>
+            </p:style>
+            <p:txBody>
+              <a:bodyPr rtlCol="0" anchor="ctr"/>
+              <a:lstStyle/>
+              <a:p>
+                <a:pPr algn="ctr"/>
+                <a:endParaRPr lang="en-US"/>
+              </a:p>
+            </p:txBody>
+          </p:sp>
+          <p:sp>
+            <p:nvSpPr>
+              <p:cNvPr id="6" name="Rounded Rectangle 5">
+                <a:extLst>
+                  <a:ext uri="{FF2B5EF4-FFF2-40B4-BE49-F238E27FC236}">
+                    <a16:creationId xmlns:a16="http://schemas.microsoft.com/office/drawing/2014/main" id="{7D92DD72-FA81-9C47-A36B-4606B45BEAE0}"/>
+                  </a:ext>
+                </a:extLst>
+              </p:cNvPr>
+              <p:cNvSpPr/>
+              <p:nvPr/>
+            </p:nvSpPr>
+            <p:spPr>
+              <a:xfrm>
+                <a:off x="3097802" y="1544364"/>
+                <a:ext cx="602868" cy="1739348"/>
+              </a:xfrm>
+              <a:prstGeom prst="roundRect">
+                <a:avLst/>
+              </a:prstGeom>
+              <a:solidFill>
+                <a:schemeClr val="accent1"/>
+              </a:solidFill>
+              <a:ln>
+                <a:noFill/>
+              </a:ln>
+            </p:spPr>
+            <p:style>
+              <a:lnRef idx="2">
+                <a:schemeClr val="accent1">
+                  <a:shade val="50000"/>
+                </a:schemeClr>
+              </a:lnRef>
+              <a:fillRef idx="1">
+                <a:schemeClr val="accent1"/>
+              </a:fillRef>
+              <a:effectRef idx="0">
+                <a:schemeClr val="accent1"/>
+              </a:effectRef>
+              <a:fontRef idx="minor">
+                <a:schemeClr val="lt1"/>
+              </a:fontRef>
+            </p:style>
+            <p:txBody>
+              <a:bodyPr rtlCol="0" anchor="ctr"/>
+              <a:lstStyle/>
+              <a:p>
+                <a:pPr algn="ctr"/>
+                <a:endParaRPr lang="en-US"/>
+              </a:p>
+            </p:txBody>
+          </p:sp>
+          <p:grpSp>
+            <p:nvGrpSpPr>
+              <p:cNvPr id="7" name="Group 6">
+                <a:extLst>
+                  <a:ext uri="{FF2B5EF4-FFF2-40B4-BE49-F238E27FC236}">
+                    <a16:creationId xmlns:a16="http://schemas.microsoft.com/office/drawing/2014/main" id="{5149945B-9AFC-9C4E-B0F2-8392C45539D7}"/>
+                  </a:ext>
+                </a:extLst>
+              </p:cNvPr>
+              <p:cNvGrpSpPr/>
+              <p:nvPr/>
+            </p:nvGrpSpPr>
+            <p:grpSpPr>
+              <a:xfrm>
+                <a:off x="3318999" y="3094157"/>
+                <a:ext cx="295704" cy="1351722"/>
+                <a:chOff x="3318999" y="3094157"/>
+                <a:chExt cx="295704" cy="1175069"/>
+              </a:xfrm>
+              <a:solidFill>
+                <a:schemeClr val="accent1"/>
+              </a:solidFill>
+            </p:grpSpPr>
+            <p:sp>
+              <p:nvSpPr>
+                <p:cNvPr id="9" name="Rounded Rectangle 8">
+                  <a:extLst>
+                    <a:ext uri="{FF2B5EF4-FFF2-40B4-BE49-F238E27FC236}">
+                      <a16:creationId xmlns:a16="http://schemas.microsoft.com/office/drawing/2014/main" id="{4EB430F0-59AF-AE4D-8000-8E6DDD40A6E3}"/>
+                    </a:ext>
+                  </a:extLst>
+                </p:cNvPr>
+                <p:cNvSpPr/>
+                <p:nvPr/>
+              </p:nvSpPr>
+              <p:spPr>
+                <a:xfrm rot="20178236">
+                  <a:off x="3346346" y="3094157"/>
+                  <a:ext cx="268357" cy="734386"/>
+                </a:xfrm>
+                <a:prstGeom prst="roundRect">
+                  <a:avLst>
+                    <a:gd name="adj" fmla="val 50000"/>
+                  </a:avLst>
+                </a:prstGeom>
+                <a:grpFill/>
+                <a:ln>
+                  <a:noFill/>
+                </a:ln>
+              </p:spPr>
+              <p:style>
+                <a:lnRef idx="2">
+                  <a:schemeClr val="accent1">
+                    <a:shade val="50000"/>
+                  </a:schemeClr>
+                </a:lnRef>
+                <a:fillRef idx="1">
+                  <a:schemeClr val="accent1"/>
+                </a:fillRef>
+                <a:effectRef idx="0">
+                  <a:schemeClr val="accent1"/>
+                </a:effectRef>
+                <a:fontRef idx="minor">
+                  <a:schemeClr val="lt1"/>
+                </a:fontRef>
+              </p:style>
+              <p:txBody>
+                <a:bodyPr rtlCol="0" anchor="ctr"/>
+                <a:lstStyle/>
+                <a:p>
+                  <a:pPr algn="ctr"/>
+                  <a:endParaRPr lang="en-US"/>
+                </a:p>
+              </p:txBody>
+            </p:sp>
+            <p:sp>
+              <p:nvSpPr>
+                <p:cNvPr id="10" name="Rounded Rectangle 9">
+                  <a:extLst>
+                    <a:ext uri="{FF2B5EF4-FFF2-40B4-BE49-F238E27FC236}">
+                      <a16:creationId xmlns:a16="http://schemas.microsoft.com/office/drawing/2014/main" id="{B8EDD4C5-CD82-1F48-A00E-CAC2BC2FB279}"/>
+                    </a:ext>
+                  </a:extLst>
+                </p:cNvPr>
+                <p:cNvSpPr/>
+                <p:nvPr/>
+              </p:nvSpPr>
+              <p:spPr>
+                <a:xfrm rot="1755876">
+                  <a:off x="3318999" y="3534840"/>
+                  <a:ext cx="268357" cy="734386"/>
+                </a:xfrm>
+                <a:prstGeom prst="roundRect">
+                  <a:avLst>
+                    <a:gd name="adj" fmla="val 50000"/>
+                  </a:avLst>
+                </a:prstGeom>
+                <a:grpFill/>
+                <a:ln>
+                  <a:noFill/>
+                </a:ln>
+              </p:spPr>
+              <p:style>
+                <a:lnRef idx="2">
+                  <a:schemeClr val="accent1">
+                    <a:shade val="50000"/>
+                  </a:schemeClr>
+                </a:lnRef>
+                <a:fillRef idx="1">
+                  <a:schemeClr val="accent1"/>
+                </a:fillRef>
+                <a:effectRef idx="0">
+                  <a:schemeClr val="accent1"/>
+                </a:effectRef>
+                <a:fontRef idx="minor">
+                  <a:schemeClr val="lt1"/>
+                </a:fontRef>
+              </p:style>
+              <p:txBody>
+                <a:bodyPr rtlCol="0" anchor="ctr"/>
+                <a:lstStyle/>
+                <a:p>
+                  <a:pPr algn="ctr"/>
+                  <a:endParaRPr lang="en-US"/>
+                </a:p>
+              </p:txBody>
+            </p:sp>
+          </p:grpSp>
+          <p:sp>
+            <p:nvSpPr>
+              <p:cNvPr id="8" name="Rounded Rectangle 7">
+                <a:extLst>
+                  <a:ext uri="{FF2B5EF4-FFF2-40B4-BE49-F238E27FC236}">
+                    <a16:creationId xmlns:a16="http://schemas.microsoft.com/office/drawing/2014/main" id="{3C305CDD-6D68-C940-86B9-325E960913A6}"/>
+                  </a:ext>
+                </a:extLst>
+              </p:cNvPr>
+              <p:cNvSpPr/>
+              <p:nvPr/>
+            </p:nvSpPr>
+            <p:spPr>
+              <a:xfrm>
+                <a:off x="3301526" y="1700897"/>
+                <a:ext cx="195419" cy="944217"/>
+              </a:xfrm>
+              <a:prstGeom prst="roundRect">
+                <a:avLst>
+                  <a:gd name="adj" fmla="val 50000"/>
+                </a:avLst>
+              </a:prstGeom>
+              <a:solidFill>
+                <a:schemeClr val="accent1"/>
+              </a:solidFill>
+              <a:ln w="28575">
+                <a:solidFill>
+                  <a:schemeClr val="bg1"/>
+                </a:solidFill>
+              </a:ln>
+            </p:spPr>
+            <p:style>
+              <a:lnRef idx="2">
+                <a:schemeClr val="accent1">
+                  <a:shade val="50000"/>
+                </a:schemeClr>
+              </a:lnRef>
+              <a:fillRef idx="1">
+                <a:schemeClr val="accent1"/>
+              </a:fillRef>
+              <a:effectRef idx="0">
+                <a:schemeClr val="accent1"/>
+              </a:effectRef>
+              <a:fontRef idx="minor">
+                <a:schemeClr val="lt1"/>
+              </a:fontRef>
+            </p:style>
+            <p:txBody>
+              <a:bodyPr rtlCol="0" anchor="ctr"/>
+              <a:lstStyle/>
+              <a:p>
+                <a:pPr algn="ctr"/>
+                <a:endParaRPr lang="en-US"/>
+              </a:p>
+            </p:txBody>
+          </p:sp>
+        </p:grpSp>
+      </p:grpSp>
+    </p:spTree>
+    <p:extLst>
+      <p:ext uri="{BB962C8B-B14F-4D97-AF65-F5344CB8AC3E}">
+        <p14:creationId xmlns:p14="http://schemas.microsoft.com/office/powerpoint/2010/main" val="359590836"/>
+      </p:ext>
+    </p:extLst>
+  </p:cSld>
+  <p:clrMapOvr>
+    <a:masterClrMapping/>
+  </p:clrMapOvr>
+</p:sld>
+</file>
+
+<file path=ppt/slides/slide5.xml><?xml version="1.0" encoding="utf-8"?>
+<p:sld xmlns:a="http://schemas.openxmlformats.org/drawingml/2006/main" xmlns:r="http://schemas.openxmlformats.org/officeDocument/2006/relationships" xmlns:p="http://schemas.openxmlformats.org/presentationml/2006/main">
+  <p:cSld>
+    <p:spTree>
+      <p:nvGrpSpPr>
+        <p:cNvPr id="1" name=""/>
+        <p:cNvGrpSpPr/>
+        <p:nvPr/>
+      </p:nvGrpSpPr>
+      <p:grpSpPr>
+        <a:xfrm>
+          <a:off x="0" y="0"/>
+          <a:ext cx="0" cy="0"/>
+          <a:chOff x="0" y="0"/>
+          <a:chExt cx="0" cy="0"/>
+        </a:xfrm>
+      </p:grpSpPr>
+      <p:grpSp>
+        <p:nvGrpSpPr>
+          <p:cNvPr id="2" name="Group 1">
+            <a:extLst>
+              <a:ext uri="{FF2B5EF4-FFF2-40B4-BE49-F238E27FC236}">
+                <a16:creationId xmlns:a16="http://schemas.microsoft.com/office/drawing/2014/main" id="{311763B3-AF43-294F-9BB8-C4E40B261DA8}"/>
+              </a:ext>
+            </a:extLst>
+          </p:cNvPr>
+          <p:cNvGrpSpPr/>
+          <p:nvPr/>
+        </p:nvGrpSpPr>
+        <p:grpSpPr>
+          <a:xfrm>
+            <a:off x="284552" y="583783"/>
+            <a:ext cx="3786214" cy="5143536"/>
+            <a:chOff x="284552" y="583783"/>
+            <a:chExt cx="3786214" cy="5143536"/>
+          </a:xfrm>
+        </p:grpSpPr>
+        <p:sp>
+          <p:nvSpPr>
+            <p:cNvPr id="38" name="Rectangle 37">
+              <a:extLst>
+                <a:ext uri="{FF2B5EF4-FFF2-40B4-BE49-F238E27FC236}">
+                  <a16:creationId xmlns:a16="http://schemas.microsoft.com/office/drawing/2014/main" id="{E3107784-A691-8A40-A4B1-A9AEF745FE60}"/>
+                </a:ext>
+              </a:extLst>
+            </p:cNvPr>
+            <p:cNvSpPr/>
+            <p:nvPr/>
+          </p:nvSpPr>
+          <p:spPr>
+            <a:xfrm>
+              <a:off x="284552" y="583783"/>
+              <a:ext cx="3786214" cy="5143536"/>
+            </a:xfrm>
+            <a:prstGeom prst="rect">
+              <a:avLst/>
+            </a:prstGeom>
+            <a:solidFill>
+              <a:schemeClr val="bg1"/>
+            </a:solidFill>
+            <a:ln>
+              <a:solidFill>
+                <a:schemeClr val="accent1">
+                  <a:shade val="50000"/>
+                </a:schemeClr>
+              </a:solidFill>
+            </a:ln>
+          </p:spPr>
+          <p:style>
+            <a:lnRef idx="2">
+              <a:schemeClr val="accent1">
+                <a:shade val="50000"/>
+              </a:schemeClr>
+            </a:lnRef>
+            <a:fillRef idx="1">
+              <a:schemeClr val="accent1"/>
+            </a:fillRef>
+            <a:effectRef idx="0">
+              <a:schemeClr val="accent1"/>
+            </a:effectRef>
+            <a:fontRef idx="minor">
+              <a:schemeClr val="lt1"/>
+            </a:fontRef>
+          </p:style>
+          <p:txBody>
+            <a:bodyPr rtlCol="0" anchor="ctr"/>
+            <a:lstStyle/>
+            <a:p>
+              <a:pPr algn="ctr"/>
+              <a:endParaRPr lang="en-CA"/>
+            </a:p>
+          </p:txBody>
+        </p:sp>
+        <p:grpSp>
+          <p:nvGrpSpPr>
+            <p:cNvPr id="11" name="Group 10">
+              <a:extLst>
+                <a:ext uri="{FF2B5EF4-FFF2-40B4-BE49-F238E27FC236}">
+                  <a16:creationId xmlns:a16="http://schemas.microsoft.com/office/drawing/2014/main" id="{7EC283D2-D5C2-DE46-913E-5293B9C6ECC6}"/>
+                </a:ext>
+              </a:extLst>
+            </p:cNvPr>
+            <p:cNvGrpSpPr>
+              <a:grpSpLocks noChangeAspect="1"/>
+            </p:cNvGrpSpPr>
+            <p:nvPr/>
+          </p:nvGrpSpPr>
+          <p:grpSpPr>
+            <a:xfrm>
+              <a:off x="1763688" y="834263"/>
+              <a:ext cx="1524318" cy="4654800"/>
+              <a:chOff x="4055272" y="834264"/>
+              <a:chExt cx="1182704" cy="3611615"/>
+            </a:xfrm>
+          </p:grpSpPr>
+          <p:sp>
+            <p:nvSpPr>
+              <p:cNvPr id="12" name="Oval 11">
+                <a:extLst>
+                  <a:ext uri="{FF2B5EF4-FFF2-40B4-BE49-F238E27FC236}">
+                    <a16:creationId xmlns:a16="http://schemas.microsoft.com/office/drawing/2014/main" id="{C96B53B7-6A95-6B40-AD6C-8D98AEFE2B83}"/>
+                  </a:ext>
+                </a:extLst>
+              </p:cNvPr>
+              <p:cNvSpPr/>
+              <p:nvPr/>
+            </p:nvSpPr>
+            <p:spPr>
+              <a:xfrm>
+                <a:off x="4055272" y="834264"/>
+                <a:ext cx="633542" cy="633542"/>
+              </a:xfrm>
+              <a:prstGeom prst="ellipse">
+                <a:avLst/>
+              </a:prstGeom>
+              <a:solidFill>
+                <a:schemeClr val="accent1"/>
+              </a:solidFill>
+              <a:ln>
+                <a:noFill/>
+              </a:ln>
+            </p:spPr>
+            <p:style>
+              <a:lnRef idx="2">
+                <a:schemeClr val="accent1">
+                  <a:shade val="50000"/>
+                </a:schemeClr>
+              </a:lnRef>
+              <a:fillRef idx="1">
+                <a:schemeClr val="accent1"/>
+              </a:fillRef>
+              <a:effectRef idx="0">
+                <a:schemeClr val="accent1"/>
+              </a:effectRef>
+              <a:fontRef idx="minor">
+                <a:schemeClr val="lt1"/>
+              </a:fontRef>
+            </p:style>
+            <p:txBody>
+              <a:bodyPr rtlCol="0" anchor="ctr"/>
+              <a:lstStyle/>
+              <a:p>
+                <a:pPr algn="ctr"/>
+                <a:endParaRPr lang="en-US"/>
+              </a:p>
+            </p:txBody>
+          </p:sp>
+          <p:sp>
+            <p:nvSpPr>
+              <p:cNvPr id="13" name="Rounded Rectangle 12">
+                <a:extLst>
+                  <a:ext uri="{FF2B5EF4-FFF2-40B4-BE49-F238E27FC236}">
+                    <a16:creationId xmlns:a16="http://schemas.microsoft.com/office/drawing/2014/main" id="{BE9BFF2A-F712-9244-9254-B372BB3FCF50}"/>
+                  </a:ext>
+                </a:extLst>
+              </p:cNvPr>
+              <p:cNvSpPr/>
+              <p:nvPr/>
+            </p:nvSpPr>
+            <p:spPr>
+              <a:xfrm>
+                <a:off x="4070609" y="1544364"/>
+                <a:ext cx="602868" cy="1739348"/>
+              </a:xfrm>
+              <a:prstGeom prst="roundRect">
+                <a:avLst/>
+              </a:prstGeom>
+              <a:solidFill>
+                <a:schemeClr val="accent1"/>
+              </a:solidFill>
+              <a:ln>
+                <a:noFill/>
+              </a:ln>
+            </p:spPr>
+            <p:style>
+              <a:lnRef idx="2">
+                <a:schemeClr val="accent1">
+                  <a:shade val="50000"/>
+                </a:schemeClr>
+              </a:lnRef>
+              <a:fillRef idx="1">
+                <a:schemeClr val="accent1"/>
+              </a:fillRef>
+              <a:effectRef idx="0">
+                <a:schemeClr val="accent1"/>
+              </a:effectRef>
+              <a:fontRef idx="minor">
+                <a:schemeClr val="lt1"/>
+              </a:fontRef>
+            </p:style>
+            <p:txBody>
+              <a:bodyPr rtlCol="0" anchor="ctr"/>
+              <a:lstStyle/>
+              <a:p>
+                <a:pPr algn="ctr"/>
+                <a:endParaRPr lang="en-US"/>
+              </a:p>
+            </p:txBody>
+          </p:sp>
+          <p:grpSp>
+            <p:nvGrpSpPr>
+              <p:cNvPr id="14" name="Group 13">
+                <a:extLst>
+                  <a:ext uri="{FF2B5EF4-FFF2-40B4-BE49-F238E27FC236}">
+                    <a16:creationId xmlns:a16="http://schemas.microsoft.com/office/drawing/2014/main" id="{424D6C69-373A-904A-8BB8-F2D8E2DD5866}"/>
+                  </a:ext>
+                </a:extLst>
+              </p:cNvPr>
+              <p:cNvGrpSpPr/>
+              <p:nvPr/>
+            </p:nvGrpSpPr>
+            <p:grpSpPr>
+              <a:xfrm>
+                <a:off x="4291806" y="3094157"/>
+                <a:ext cx="295704" cy="1351722"/>
+                <a:chOff x="3318999" y="3094157"/>
+                <a:chExt cx="295704" cy="1175069"/>
+              </a:xfrm>
+              <a:solidFill>
+                <a:schemeClr val="accent1"/>
+              </a:solidFill>
+            </p:grpSpPr>
+            <p:sp>
+              <p:nvSpPr>
+                <p:cNvPr id="16" name="Rounded Rectangle 15">
+                  <a:extLst>
+                    <a:ext uri="{FF2B5EF4-FFF2-40B4-BE49-F238E27FC236}">
+                      <a16:creationId xmlns:a16="http://schemas.microsoft.com/office/drawing/2014/main" id="{C10C7A04-2A82-0345-A1F1-E3B634B87BAC}"/>
+                    </a:ext>
+                  </a:extLst>
+                </p:cNvPr>
+                <p:cNvSpPr/>
+                <p:nvPr/>
+              </p:nvSpPr>
+              <p:spPr>
+                <a:xfrm rot="20178236">
+                  <a:off x="3346346" y="3094157"/>
+                  <a:ext cx="268357" cy="734386"/>
+                </a:xfrm>
+                <a:prstGeom prst="roundRect">
+                  <a:avLst>
+                    <a:gd name="adj" fmla="val 50000"/>
+                  </a:avLst>
+                </a:prstGeom>
+                <a:grpFill/>
+                <a:ln>
+                  <a:noFill/>
+                </a:ln>
+              </p:spPr>
+              <p:style>
+                <a:lnRef idx="2">
+                  <a:schemeClr val="accent1">
+                    <a:shade val="50000"/>
+                  </a:schemeClr>
+                </a:lnRef>
+                <a:fillRef idx="1">
+                  <a:schemeClr val="accent1"/>
+                </a:fillRef>
+                <a:effectRef idx="0">
+                  <a:schemeClr val="accent1"/>
+                </a:effectRef>
+                <a:fontRef idx="minor">
+                  <a:schemeClr val="lt1"/>
+                </a:fontRef>
+              </p:style>
+              <p:txBody>
+                <a:bodyPr rtlCol="0" anchor="ctr"/>
+                <a:lstStyle/>
+                <a:p>
+                  <a:pPr algn="ctr"/>
+                  <a:endParaRPr lang="en-US"/>
+                </a:p>
+              </p:txBody>
+            </p:sp>
+            <p:sp>
+              <p:nvSpPr>
+                <p:cNvPr id="17" name="Rounded Rectangle 16">
+                  <a:extLst>
+                    <a:ext uri="{FF2B5EF4-FFF2-40B4-BE49-F238E27FC236}">
+                      <a16:creationId xmlns:a16="http://schemas.microsoft.com/office/drawing/2014/main" id="{CD6B91D7-E8D0-1142-A115-6BB814F7A1C3}"/>
+                    </a:ext>
+                  </a:extLst>
+                </p:cNvPr>
+                <p:cNvSpPr/>
+                <p:nvPr/>
+              </p:nvSpPr>
+              <p:spPr>
+                <a:xfrm rot="1755876">
+                  <a:off x="3318999" y="3534840"/>
+                  <a:ext cx="268357" cy="734386"/>
+                </a:xfrm>
+                <a:prstGeom prst="roundRect">
+                  <a:avLst>
+                    <a:gd name="adj" fmla="val 50000"/>
+                  </a:avLst>
+                </a:prstGeom>
+                <a:grpFill/>
+                <a:ln>
+                  <a:noFill/>
+                </a:ln>
+              </p:spPr>
+              <p:style>
+                <a:lnRef idx="2">
+                  <a:schemeClr val="accent1">
+                    <a:shade val="50000"/>
+                  </a:schemeClr>
+                </a:lnRef>
+                <a:fillRef idx="1">
+                  <a:schemeClr val="accent1"/>
+                </a:fillRef>
+                <a:effectRef idx="0">
+                  <a:schemeClr val="accent1"/>
+                </a:effectRef>
+                <a:fontRef idx="minor">
+                  <a:schemeClr val="lt1"/>
+                </a:fontRef>
+              </p:style>
+              <p:txBody>
+                <a:bodyPr rtlCol="0" anchor="ctr"/>
+                <a:lstStyle/>
+                <a:p>
+                  <a:pPr algn="ctr"/>
+                  <a:endParaRPr lang="en-US"/>
+                </a:p>
+              </p:txBody>
+            </p:sp>
+          </p:grpSp>
+          <p:sp>
+            <p:nvSpPr>
+              <p:cNvPr id="15" name="Rounded Rectangle 14">
+                <a:extLst>
+                  <a:ext uri="{FF2B5EF4-FFF2-40B4-BE49-F238E27FC236}">
+                    <a16:creationId xmlns:a16="http://schemas.microsoft.com/office/drawing/2014/main" id="{98DC6F03-C885-074C-92BD-91BCA2DC8ABB}"/>
+                  </a:ext>
+                </a:extLst>
+              </p:cNvPr>
+              <p:cNvSpPr/>
+              <p:nvPr/>
+            </p:nvSpPr>
+            <p:spPr>
+              <a:xfrm rot="16200000">
+                <a:off x="4668158" y="1326498"/>
+                <a:ext cx="195419" cy="944217"/>
+              </a:xfrm>
+              <a:prstGeom prst="roundRect">
+                <a:avLst>
+                  <a:gd name="adj" fmla="val 50000"/>
+                </a:avLst>
+              </a:prstGeom>
+              <a:solidFill>
+                <a:schemeClr val="accent1"/>
+              </a:solidFill>
+              <a:ln w="28575">
+                <a:solidFill>
+                  <a:schemeClr val="bg1"/>
+                </a:solidFill>
+              </a:ln>
+            </p:spPr>
+            <p:style>
+              <a:lnRef idx="2">
+                <a:schemeClr val="accent1">
+                  <a:shade val="50000"/>
+                </a:schemeClr>
+              </a:lnRef>
+              <a:fillRef idx="1">
+                <a:schemeClr val="accent1"/>
+              </a:fillRef>
+              <a:effectRef idx="0">
+                <a:schemeClr val="accent1"/>
+              </a:effectRef>
+              <a:fontRef idx="minor">
+                <a:schemeClr val="lt1"/>
+              </a:fontRef>
+            </p:style>
+            <p:txBody>
+              <a:bodyPr rtlCol="0" anchor="ctr"/>
+              <a:lstStyle/>
+              <a:p>
+                <a:pPr algn="ctr"/>
+                <a:endParaRPr lang="en-US"/>
+              </a:p>
+            </p:txBody>
+          </p:sp>
+        </p:grpSp>
+      </p:grpSp>
+    </p:spTree>
+    <p:extLst>
+      <p:ext uri="{BB962C8B-B14F-4D97-AF65-F5344CB8AC3E}">
+        <p14:creationId xmlns:p14="http://schemas.microsoft.com/office/powerpoint/2010/main" val="1468875593"/>
+      </p:ext>
+    </p:extLst>
+  </p:cSld>
+  <p:clrMapOvr>
+    <a:masterClrMapping/>
+  </p:clrMapOvr>
+</p:sld>
+</file>
+
+<file path=ppt/slides/slide6.xml><?xml version="1.0" encoding="utf-8"?>
+<p:sld xmlns:a="http://schemas.openxmlformats.org/drawingml/2006/main" xmlns:r="http://schemas.openxmlformats.org/officeDocument/2006/relationships" xmlns:p="http://schemas.openxmlformats.org/presentationml/2006/main">
+  <p:cSld>
+    <p:spTree>
+      <p:nvGrpSpPr>
+        <p:cNvPr id="1" name=""/>
+        <p:cNvGrpSpPr/>
+        <p:nvPr/>
+      </p:nvGrpSpPr>
+      <p:grpSpPr>
+        <a:xfrm>
+          <a:off x="0" y="0"/>
+          <a:ext cx="0" cy="0"/>
+          <a:chOff x="0" y="0"/>
+          <a:chExt cx="0" cy="0"/>
+        </a:xfrm>
+      </p:grpSpPr>
+      <p:grpSp>
+        <p:nvGrpSpPr>
+          <p:cNvPr id="2" name="Group 1">
+            <a:extLst>
+              <a:ext uri="{FF2B5EF4-FFF2-40B4-BE49-F238E27FC236}">
+                <a16:creationId xmlns:a16="http://schemas.microsoft.com/office/drawing/2014/main" id="{DD80614F-42FC-F649-A8B5-EEBF85053A59}"/>
+              </a:ext>
+            </a:extLst>
+          </p:cNvPr>
+          <p:cNvGrpSpPr/>
+          <p:nvPr/>
+        </p:nvGrpSpPr>
+        <p:grpSpPr>
+          <a:xfrm>
+            <a:off x="284552" y="583783"/>
+            <a:ext cx="3786214" cy="5143536"/>
+            <a:chOff x="284552" y="583783"/>
+            <a:chExt cx="3786214" cy="5143536"/>
+          </a:xfrm>
+        </p:grpSpPr>
+        <p:sp>
+          <p:nvSpPr>
+            <p:cNvPr id="38" name="Rectangle 37">
+              <a:extLst>
+                <a:ext uri="{FF2B5EF4-FFF2-40B4-BE49-F238E27FC236}">
+                  <a16:creationId xmlns:a16="http://schemas.microsoft.com/office/drawing/2014/main" id="{E3107784-A691-8A40-A4B1-A9AEF745FE60}"/>
+                </a:ext>
+              </a:extLst>
+            </p:cNvPr>
+            <p:cNvSpPr/>
+            <p:nvPr/>
+          </p:nvSpPr>
+          <p:spPr>
+            <a:xfrm>
+              <a:off x="284552" y="583783"/>
+              <a:ext cx="3786214" cy="5143536"/>
+            </a:xfrm>
+            <a:prstGeom prst="rect">
+              <a:avLst/>
+            </a:prstGeom>
+            <a:solidFill>
+              <a:schemeClr val="bg1"/>
+            </a:solidFill>
+            <a:ln>
+              <a:solidFill>
+                <a:schemeClr val="accent1">
+                  <a:shade val="50000"/>
+                </a:schemeClr>
+              </a:solidFill>
+            </a:ln>
+          </p:spPr>
+          <p:style>
+            <a:lnRef idx="2">
+              <a:schemeClr val="accent1">
+                <a:shade val="50000"/>
+              </a:schemeClr>
+            </a:lnRef>
+            <a:fillRef idx="1">
+              <a:schemeClr val="accent1"/>
+            </a:fillRef>
+            <a:effectRef idx="0">
+              <a:schemeClr val="accent1"/>
+            </a:effectRef>
+            <a:fontRef idx="minor">
+              <a:schemeClr val="lt1"/>
+            </a:fontRef>
+          </p:style>
+          <p:txBody>
+            <a:bodyPr rtlCol="0" anchor="ctr"/>
+            <a:lstStyle/>
+            <a:p>
+              <a:pPr algn="ctr"/>
+              <a:endParaRPr lang="en-CA"/>
+            </a:p>
+          </p:txBody>
+        </p:sp>
+        <p:grpSp>
+          <p:nvGrpSpPr>
+            <p:cNvPr id="18" name="Group 17">
+              <a:extLst>
+                <a:ext uri="{FF2B5EF4-FFF2-40B4-BE49-F238E27FC236}">
+                  <a16:creationId xmlns:a16="http://schemas.microsoft.com/office/drawing/2014/main" id="{8CF00998-0BA5-F345-8060-9D09CD16EDCC}"/>
+                </a:ext>
+              </a:extLst>
+            </p:cNvPr>
+            <p:cNvGrpSpPr>
+              <a:grpSpLocks noChangeAspect="1"/>
+            </p:cNvGrpSpPr>
+            <p:nvPr/>
+          </p:nvGrpSpPr>
+          <p:grpSpPr>
+            <a:xfrm>
+              <a:off x="1290522" y="836712"/>
+              <a:ext cx="1769310" cy="4575383"/>
+              <a:chOff x="7816857" y="894813"/>
+              <a:chExt cx="1348950" cy="3488344"/>
+            </a:xfrm>
+            <a:solidFill>
+              <a:srgbClr val="4F81BD">
+                <a:alpha val="32941"/>
+              </a:srgbClr>
+            </a:solidFill>
+          </p:grpSpPr>
+          <p:sp>
+            <p:nvSpPr>
+              <p:cNvPr id="20" name="Rounded Rectangle 19">
+                <a:extLst>
+                  <a:ext uri="{FF2B5EF4-FFF2-40B4-BE49-F238E27FC236}">
+                    <a16:creationId xmlns:a16="http://schemas.microsoft.com/office/drawing/2014/main" id="{42F37007-9686-C243-8BAE-CED8AD9901B3}"/>
+                  </a:ext>
+                </a:extLst>
+              </p:cNvPr>
+              <p:cNvSpPr/>
+              <p:nvPr/>
+            </p:nvSpPr>
+            <p:spPr>
+              <a:xfrm>
+                <a:off x="8055344" y="1590261"/>
+                <a:ext cx="871976" cy="1739348"/>
+              </a:xfrm>
+              <a:prstGeom prst="roundRect">
+                <a:avLst/>
+              </a:prstGeom>
+              <a:grpFill/>
+              <a:ln>
+                <a:noFill/>
+              </a:ln>
+            </p:spPr>
+            <p:style>
+              <a:lnRef idx="2">
+                <a:schemeClr val="accent1">
+                  <a:shade val="50000"/>
+                </a:schemeClr>
+              </a:lnRef>
+              <a:fillRef idx="1">
+                <a:schemeClr val="accent1"/>
+              </a:fillRef>
+              <a:effectRef idx="0">
+                <a:schemeClr val="accent1"/>
+              </a:effectRef>
+              <a:fontRef idx="minor">
+                <a:schemeClr val="lt1"/>
+              </a:fontRef>
+            </p:style>
+            <p:txBody>
+              <a:bodyPr rtlCol="0" anchor="ctr"/>
+              <a:lstStyle/>
+              <a:p>
+                <a:pPr algn="ctr"/>
+                <a:endParaRPr lang="en-US"/>
+              </a:p>
+            </p:txBody>
+          </p:sp>
+          <p:sp>
+            <p:nvSpPr>
+              <p:cNvPr id="19" name="Oval 18">
+                <a:extLst>
+                  <a:ext uri="{FF2B5EF4-FFF2-40B4-BE49-F238E27FC236}">
+                    <a16:creationId xmlns:a16="http://schemas.microsoft.com/office/drawing/2014/main" id="{7530D538-9AEA-2C4E-93F4-AE6DA2D70327}"/>
+                  </a:ext>
+                </a:extLst>
+              </p:cNvPr>
+              <p:cNvSpPr/>
+              <p:nvPr/>
+            </p:nvSpPr>
+            <p:spPr>
+              <a:xfrm>
+                <a:off x="8174561" y="894813"/>
+                <a:ext cx="633542" cy="633542"/>
+              </a:xfrm>
+              <a:prstGeom prst="ellipse">
+                <a:avLst/>
+              </a:prstGeom>
+              <a:grpFill/>
+              <a:ln>
+                <a:noFill/>
+              </a:ln>
+            </p:spPr>
+            <p:style>
+              <a:lnRef idx="2">
+                <a:schemeClr val="accent1">
+                  <a:shade val="50000"/>
+                </a:schemeClr>
+              </a:lnRef>
+              <a:fillRef idx="1">
+                <a:schemeClr val="accent1"/>
+              </a:fillRef>
+              <a:effectRef idx="0">
+                <a:schemeClr val="accent1"/>
+              </a:effectRef>
+              <a:fontRef idx="minor">
+                <a:schemeClr val="lt1"/>
+              </a:fontRef>
+            </p:style>
+            <p:txBody>
+              <a:bodyPr rtlCol="0" anchor="ctr"/>
+              <a:lstStyle/>
+              <a:p>
+                <a:pPr algn="ctr"/>
+                <a:endParaRPr lang="en-US" dirty="0"/>
+              </a:p>
+            </p:txBody>
+          </p:sp>
+          <p:sp>
+            <p:nvSpPr>
+              <p:cNvPr id="21" name="Rounded Rectangle 20">
+                <a:extLst>
+                  <a:ext uri="{FF2B5EF4-FFF2-40B4-BE49-F238E27FC236}">
+                    <a16:creationId xmlns:a16="http://schemas.microsoft.com/office/drawing/2014/main" id="{855430CF-A672-CB48-9DD5-3482B4DF0D09}"/>
+                  </a:ext>
+                </a:extLst>
+              </p:cNvPr>
+              <p:cNvSpPr/>
+              <p:nvPr/>
+            </p:nvSpPr>
+            <p:spPr>
+              <a:xfrm>
+                <a:off x="8055344" y="3031435"/>
+                <a:ext cx="268357" cy="1351722"/>
+              </a:xfrm>
+              <a:prstGeom prst="roundRect">
+                <a:avLst>
+                  <a:gd name="adj" fmla="val 50000"/>
+                </a:avLst>
+              </a:prstGeom>
+              <a:grpFill/>
+              <a:ln>
+                <a:noFill/>
+              </a:ln>
+            </p:spPr>
+            <p:style>
+              <a:lnRef idx="2">
+                <a:schemeClr val="accent1">
+                  <a:shade val="50000"/>
+                </a:schemeClr>
+              </a:lnRef>
+              <a:fillRef idx="1">
+                <a:schemeClr val="accent1"/>
+              </a:fillRef>
+              <a:effectRef idx="0">
+                <a:schemeClr val="accent1"/>
+              </a:effectRef>
+              <a:fontRef idx="minor">
+                <a:schemeClr val="lt1"/>
+              </a:fontRef>
+            </p:style>
+            <p:txBody>
+              <a:bodyPr rtlCol="0" anchor="ctr"/>
+              <a:lstStyle/>
+              <a:p>
+                <a:pPr algn="ctr"/>
+                <a:endParaRPr lang="en-US" dirty="0"/>
+              </a:p>
+            </p:txBody>
+          </p:sp>
+          <p:sp>
+            <p:nvSpPr>
+              <p:cNvPr id="22" name="Rounded Rectangle 21">
+                <a:extLst>
+                  <a:ext uri="{FF2B5EF4-FFF2-40B4-BE49-F238E27FC236}">
+                    <a16:creationId xmlns:a16="http://schemas.microsoft.com/office/drawing/2014/main" id="{D2749C59-D722-4E45-AC42-0D0AFBE71824}"/>
+                  </a:ext>
+                </a:extLst>
+              </p:cNvPr>
+              <p:cNvSpPr/>
+              <p:nvPr/>
+            </p:nvSpPr>
+            <p:spPr>
+              <a:xfrm>
+                <a:off x="8658963" y="3031435"/>
+                <a:ext cx="268357" cy="1351722"/>
+              </a:xfrm>
+              <a:prstGeom prst="roundRect">
+                <a:avLst>
+                  <a:gd name="adj" fmla="val 50000"/>
+                </a:avLst>
+              </a:prstGeom>
+              <a:grpFill/>
+              <a:ln>
+                <a:noFill/>
+              </a:ln>
+            </p:spPr>
+            <p:style>
+              <a:lnRef idx="2">
+                <a:schemeClr val="accent1">
+                  <a:shade val="50000"/>
+                </a:schemeClr>
+              </a:lnRef>
+              <a:fillRef idx="1">
+                <a:schemeClr val="accent1"/>
+              </a:fillRef>
+              <a:effectRef idx="0">
+                <a:schemeClr val="accent1"/>
+              </a:effectRef>
+              <a:fontRef idx="minor">
+                <a:schemeClr val="lt1"/>
+              </a:fontRef>
+            </p:style>
+            <p:txBody>
+              <a:bodyPr rtlCol="0" anchor="ctr"/>
+              <a:lstStyle/>
+              <a:p>
+                <a:pPr algn="ctr"/>
+                <a:endParaRPr lang="en-US"/>
+              </a:p>
+            </p:txBody>
+          </p:sp>
+          <p:sp>
+            <p:nvSpPr>
+              <p:cNvPr id="23" name="Rounded Rectangle 22">
+                <a:extLst>
+                  <a:ext uri="{FF2B5EF4-FFF2-40B4-BE49-F238E27FC236}">
+                    <a16:creationId xmlns:a16="http://schemas.microsoft.com/office/drawing/2014/main" id="{5E2E9FA7-3FAF-A642-B2ED-3AC99E3EC88D}"/>
+                  </a:ext>
+                </a:extLst>
+              </p:cNvPr>
+              <p:cNvSpPr/>
+              <p:nvPr/>
+            </p:nvSpPr>
+            <p:spPr>
+              <a:xfrm>
+                <a:off x="8970388" y="1659834"/>
+                <a:ext cx="195419" cy="944217"/>
+              </a:xfrm>
+              <a:prstGeom prst="roundRect">
+                <a:avLst>
+                  <a:gd name="adj" fmla="val 50000"/>
+                </a:avLst>
+              </a:prstGeom>
+              <a:grpFill/>
+              <a:ln>
+                <a:noFill/>
+              </a:ln>
+            </p:spPr>
+            <p:style>
+              <a:lnRef idx="2">
+                <a:schemeClr val="accent1">
+                  <a:shade val="50000"/>
+                </a:schemeClr>
+              </a:lnRef>
+              <a:fillRef idx="1">
+                <a:schemeClr val="accent1"/>
+              </a:fillRef>
+              <a:effectRef idx="0">
+                <a:schemeClr val="accent1"/>
+              </a:effectRef>
+              <a:fontRef idx="minor">
+                <a:schemeClr val="lt1"/>
+              </a:fontRef>
+            </p:style>
+            <p:txBody>
+              <a:bodyPr rtlCol="0" anchor="ctr"/>
+              <a:lstStyle/>
+              <a:p>
+                <a:pPr algn="ctr"/>
+                <a:endParaRPr lang="en-US"/>
+              </a:p>
+            </p:txBody>
+          </p:sp>
+          <p:sp>
+            <p:nvSpPr>
+              <p:cNvPr id="24" name="Rounded Rectangle 23">
+                <a:extLst>
+                  <a:ext uri="{FF2B5EF4-FFF2-40B4-BE49-F238E27FC236}">
+                    <a16:creationId xmlns:a16="http://schemas.microsoft.com/office/drawing/2014/main" id="{31D9CFCA-7EA1-004A-B817-7A8AFEE0884C}"/>
+                  </a:ext>
+                </a:extLst>
+              </p:cNvPr>
+              <p:cNvSpPr/>
+              <p:nvPr/>
+            </p:nvSpPr>
+            <p:spPr>
+              <a:xfrm>
+                <a:off x="7816857" y="1659834"/>
+                <a:ext cx="195419" cy="944217"/>
+              </a:xfrm>
+              <a:prstGeom prst="roundRect">
+                <a:avLst>
+                  <a:gd name="adj" fmla="val 50000"/>
+                </a:avLst>
+              </a:prstGeom>
+              <a:grpFill/>
+              <a:ln>
+                <a:noFill/>
+              </a:ln>
+            </p:spPr>
+            <p:style>
+              <a:lnRef idx="2">
+                <a:schemeClr val="accent1">
+                  <a:shade val="50000"/>
+                </a:schemeClr>
+              </a:lnRef>
+              <a:fillRef idx="1">
+                <a:schemeClr val="accent1"/>
+              </a:fillRef>
+              <a:effectRef idx="0">
+                <a:schemeClr val="accent1"/>
+              </a:effectRef>
+              <a:fontRef idx="minor">
+                <a:schemeClr val="lt1"/>
+              </a:fontRef>
+            </p:style>
+            <p:txBody>
+              <a:bodyPr rtlCol="0" anchor="ctr"/>
+              <a:lstStyle/>
+              <a:p>
+                <a:pPr algn="ctr"/>
+                <a:endParaRPr lang="en-US"/>
+              </a:p>
+            </p:txBody>
+          </p:sp>
+        </p:grpSp>
+        <p:sp>
+          <p:nvSpPr>
+            <p:cNvPr id="11" name="&quot;No&quot; Symbol 10">
+              <a:extLst>
+                <a:ext uri="{FF2B5EF4-FFF2-40B4-BE49-F238E27FC236}">
+                  <a16:creationId xmlns:a16="http://schemas.microsoft.com/office/drawing/2014/main" id="{62BED268-9111-6941-8354-1997CD4A6502}"/>
+                </a:ext>
+              </a:extLst>
+            </p:cNvPr>
+            <p:cNvSpPr/>
+            <p:nvPr/>
+          </p:nvSpPr>
+          <p:spPr>
+            <a:xfrm>
+              <a:off x="1002488" y="1746550"/>
+              <a:ext cx="2345376" cy="2286016"/>
+            </a:xfrm>
+            <a:prstGeom prst="noSmoking">
+              <a:avLst>
+                <a:gd name="adj" fmla="val 12773"/>
+              </a:avLst>
+            </a:prstGeom>
+          </p:spPr>
+          <p:style>
+            <a:lnRef idx="2">
+              <a:schemeClr val="accent1">
+                <a:shade val="50000"/>
+              </a:schemeClr>
+            </a:lnRef>
+            <a:fillRef idx="1">
+              <a:schemeClr val="accent1"/>
+            </a:fillRef>
+            <a:effectRef idx="0">
+              <a:schemeClr val="accent1"/>
+            </a:effectRef>
+            <a:fontRef idx="minor">
+              <a:schemeClr val="lt1"/>
+            </a:fontRef>
+          </p:style>
+          <p:txBody>
+            <a:bodyPr rtlCol="0" anchor="ctr"/>
+            <a:lstStyle/>
+            <a:p>
+              <a:pPr algn="ctr"/>
+              <a:endParaRPr lang="en-CA">
+                <a:solidFill>
+                  <a:schemeClr val="tx1"/>
+                </a:solidFill>
+              </a:endParaRPr>
+            </a:p>
+          </p:txBody>
+        </p:sp>
+      </p:grpSp>
+      <p:sp>
+        <p:nvSpPr>
+          <p:cNvPr id="3" name="TextBox 2">
+            <a:extLst>
+              <a:ext uri="{FF2B5EF4-FFF2-40B4-BE49-F238E27FC236}">
+                <a16:creationId xmlns:a16="http://schemas.microsoft.com/office/drawing/2014/main" id="{9C73C642-E361-A641-89D4-8C874CFD81DA}"/>
+              </a:ext>
+            </a:extLst>
+          </p:cNvPr>
+          <p:cNvSpPr txBox="1"/>
+          <p:nvPr/>
+        </p:nvSpPr>
+        <p:spPr>
+          <a:xfrm>
+            <a:off x="6190593" y="3247697"/>
+            <a:ext cx="184731" cy="369332"/>
+          </a:xfrm>
+          <a:prstGeom prst="rect">
+            <a:avLst/>
+          </a:prstGeom>
+          <a:noFill/>
+        </p:spPr>
+        <p:txBody>
+          <a:bodyPr wrap="none" rtlCol="0">
+            <a:spAutoFit/>
+          </a:bodyPr>
+          <a:lstStyle/>
+          <a:p>
+            <a:endParaRPr lang="en-US"/>
+          </a:p>
+        </p:txBody>
+      </p:sp>
+    </p:spTree>
+    <p:extLst>
+      <p:ext uri="{BB962C8B-B14F-4D97-AF65-F5344CB8AC3E}">
+        <p14:creationId xmlns:p14="http://schemas.microsoft.com/office/powerpoint/2010/main" val="401641739"/>
+      </p:ext>
+    </p:extLst>
+  </p:cSld>
+  <p:clrMapOvr>
+    <a:masterClrMapping/>
+  </p:clrMapOvr>
+</p:sld>
+</file>
+
+<file path=ppt/slides/slide7.xml><?xml version="1.0" encoding="utf-8"?>
 <p:sld xmlns:a="http://schemas.openxmlformats.org/drawingml/2006/main" xmlns:r="http://schemas.openxmlformats.org/officeDocument/2006/relationships" xmlns:p="http://schemas.openxmlformats.org/presentationml/2006/main">
   <p:cSld>
     <p:spTree>
@@ -3558,14 +5741,9 @@
           <a:p>
             <a:pPr algn="ctr"/>
             <a:r>
-              <a:rPr lang="en-CA" dirty="0" smtClean="0"/>
-              <a:t>Prediction: </a:t>
-            </a:r>
-            <a:r>
-              <a:rPr lang="en-CA" dirty="0" smtClean="0"/>
-              <a:t>Unknown</a:t>
-            </a:r>
-            <a:endParaRPr lang="en-CA" dirty="0"/>
+              <a:rPr lang="en-CA" dirty="0"/>
+              <a:t>Prediction: Unknown</a:t>
+            </a:r>
           </a:p>
         </p:txBody>
       </p:sp>

</xml_diff>